<commit_message>
20 Dec 2020 SHZ Office
</commit_message>
<xml_diff>
--- a/etc/Octree_Machanism.pptx
+++ b/etc/Octree_Machanism.pptx
@@ -5,7 +5,7 @@
     <p:sldMasterId id="2147483648" r:id="rId1"/>
   </p:sldMasterIdLst>
   <p:notesMasterIdLst>
-    <p:notesMasterId r:id="rId12"/>
+    <p:notesMasterId r:id="rId13"/>
   </p:notesMasterIdLst>
   <p:sldIdLst>
     <p:sldId id="256" r:id="rId2"/>
@@ -18,6 +18,7 @@
     <p:sldId id="258" r:id="rId9"/>
     <p:sldId id="265" r:id="rId10"/>
     <p:sldId id="259" r:id="rId11"/>
+    <p:sldId id="266" r:id="rId12"/>
   </p:sldIdLst>
   <p:sldSz cx="12192000" cy="6858000"/>
   <p:notesSz cx="6858000" cy="9144000"/>
@@ -206,7 +207,7 @@
           <a:p>
             <a:fld id="{4A9EC5E2-9960-4CE5-BBF9-CC6A3A85A6BA}" type="datetimeFigureOut">
               <a:rPr lang="zh-CN" altLang="en-US" smtClean="0"/>
-              <a:t>2020/12/12</a:t>
+              <a:t>2020/12/20</a:t>
             </a:fld>
             <a:endParaRPr lang="zh-CN" altLang="en-US"/>
           </a:p>
@@ -704,7 +705,7 @@
           <a:p>
             <a:fld id="{117B3124-7878-45FD-A888-9101914B5913}" type="datetimeFigureOut">
               <a:rPr lang="zh-CN" altLang="en-US" smtClean="0"/>
-              <a:t>2020/12/12</a:t>
+              <a:t>2020/12/20</a:t>
             </a:fld>
             <a:endParaRPr lang="zh-CN" altLang="en-US"/>
           </a:p>
@@ -902,7 +903,7 @@
           <a:p>
             <a:fld id="{117B3124-7878-45FD-A888-9101914B5913}" type="datetimeFigureOut">
               <a:rPr lang="zh-CN" altLang="en-US" smtClean="0"/>
-              <a:t>2020/12/12</a:t>
+              <a:t>2020/12/20</a:t>
             </a:fld>
             <a:endParaRPr lang="zh-CN" altLang="en-US"/>
           </a:p>
@@ -1110,7 +1111,7 @@
           <a:p>
             <a:fld id="{117B3124-7878-45FD-A888-9101914B5913}" type="datetimeFigureOut">
               <a:rPr lang="zh-CN" altLang="en-US" smtClean="0"/>
-              <a:t>2020/12/12</a:t>
+              <a:t>2020/12/20</a:t>
             </a:fld>
             <a:endParaRPr lang="zh-CN" altLang="en-US"/>
           </a:p>
@@ -1308,7 +1309,7 @@
           <a:p>
             <a:fld id="{117B3124-7878-45FD-A888-9101914B5913}" type="datetimeFigureOut">
               <a:rPr lang="zh-CN" altLang="en-US" smtClean="0"/>
-              <a:t>2020/12/12</a:t>
+              <a:t>2020/12/20</a:t>
             </a:fld>
             <a:endParaRPr lang="zh-CN" altLang="en-US"/>
           </a:p>
@@ -1583,7 +1584,7 @@
           <a:p>
             <a:fld id="{117B3124-7878-45FD-A888-9101914B5913}" type="datetimeFigureOut">
               <a:rPr lang="zh-CN" altLang="en-US" smtClean="0"/>
-              <a:t>2020/12/12</a:t>
+              <a:t>2020/12/20</a:t>
             </a:fld>
             <a:endParaRPr lang="zh-CN" altLang="en-US"/>
           </a:p>
@@ -1848,7 +1849,7 @@
           <a:p>
             <a:fld id="{117B3124-7878-45FD-A888-9101914B5913}" type="datetimeFigureOut">
               <a:rPr lang="zh-CN" altLang="en-US" smtClean="0"/>
-              <a:t>2020/12/12</a:t>
+              <a:t>2020/12/20</a:t>
             </a:fld>
             <a:endParaRPr lang="zh-CN" altLang="en-US"/>
           </a:p>
@@ -2260,7 +2261,7 @@
           <a:p>
             <a:fld id="{117B3124-7878-45FD-A888-9101914B5913}" type="datetimeFigureOut">
               <a:rPr lang="zh-CN" altLang="en-US" smtClean="0"/>
-              <a:t>2020/12/12</a:t>
+              <a:t>2020/12/20</a:t>
             </a:fld>
             <a:endParaRPr lang="zh-CN" altLang="en-US"/>
           </a:p>
@@ -2401,7 +2402,7 @@
           <a:p>
             <a:fld id="{117B3124-7878-45FD-A888-9101914B5913}" type="datetimeFigureOut">
               <a:rPr lang="zh-CN" altLang="en-US" smtClean="0"/>
-              <a:t>2020/12/12</a:t>
+              <a:t>2020/12/20</a:t>
             </a:fld>
             <a:endParaRPr lang="zh-CN" altLang="en-US"/>
           </a:p>
@@ -2514,7 +2515,7 @@
           <a:p>
             <a:fld id="{117B3124-7878-45FD-A888-9101914B5913}" type="datetimeFigureOut">
               <a:rPr lang="zh-CN" altLang="en-US" smtClean="0"/>
-              <a:t>2020/12/12</a:t>
+              <a:t>2020/12/20</a:t>
             </a:fld>
             <a:endParaRPr lang="zh-CN" altLang="en-US"/>
           </a:p>
@@ -2825,7 +2826,7 @@
           <a:p>
             <a:fld id="{117B3124-7878-45FD-A888-9101914B5913}" type="datetimeFigureOut">
               <a:rPr lang="zh-CN" altLang="en-US" smtClean="0"/>
-              <a:t>2020/12/12</a:t>
+              <a:t>2020/12/20</a:t>
             </a:fld>
             <a:endParaRPr lang="zh-CN" altLang="en-US"/>
           </a:p>
@@ -3113,7 +3114,7 @@
           <a:p>
             <a:fld id="{117B3124-7878-45FD-A888-9101914B5913}" type="datetimeFigureOut">
               <a:rPr lang="zh-CN" altLang="en-US" smtClean="0"/>
-              <a:t>2020/12/12</a:t>
+              <a:t>2020/12/20</a:t>
             </a:fld>
             <a:endParaRPr lang="zh-CN" altLang="en-US"/>
           </a:p>
@@ -3354,7 +3355,7 @@
           <a:p>
             <a:fld id="{117B3124-7878-45FD-A888-9101914B5913}" type="datetimeFigureOut">
               <a:rPr lang="zh-CN" altLang="en-US" smtClean="0"/>
-              <a:t>2020/12/12</a:t>
+              <a:t>2020/12/20</a:t>
             </a:fld>
             <a:endParaRPr lang="zh-CN" altLang="en-US"/>
           </a:p>
@@ -5502,6 +5503,321 @@
     <p:extLst>
       <p:ext uri="{BB962C8B-B14F-4D97-AF65-F5344CB8AC3E}">
         <p14:creationId xmlns:p14="http://schemas.microsoft.com/office/powerpoint/2010/main" val="3414807166"/>
+      </p:ext>
+    </p:extLst>
+  </p:cSld>
+  <p:clrMapOvr>
+    <a:masterClrMapping/>
+  </p:clrMapOvr>
+</p:sld>
+</file>
+
+<file path=ppt/slides/slide11.xml><?xml version="1.0" encoding="utf-8"?>
+<p:sld xmlns:a="http://schemas.openxmlformats.org/drawingml/2006/main" xmlns:r="http://schemas.openxmlformats.org/officeDocument/2006/relationships" xmlns:p="http://schemas.openxmlformats.org/presentationml/2006/main">
+  <p:cSld>
+    <p:spTree>
+      <p:nvGrpSpPr>
+        <p:cNvPr id="1" name=""/>
+        <p:cNvGrpSpPr/>
+        <p:nvPr/>
+      </p:nvGrpSpPr>
+      <p:grpSpPr>
+        <a:xfrm>
+          <a:off x="0" y="0"/>
+          <a:ext cx="0" cy="0"/>
+          <a:chOff x="0" y="0"/>
+          <a:chExt cx="0" cy="0"/>
+        </a:xfrm>
+      </p:grpSpPr>
+      <p:sp>
+        <p:nvSpPr>
+          <p:cNvPr id="6" name="文本框 5">
+            <a:extLst>
+              <a:ext uri="{FF2B5EF4-FFF2-40B4-BE49-F238E27FC236}">
+                <a16:creationId xmlns:a16="http://schemas.microsoft.com/office/drawing/2014/main" id="{A40BC1FA-F783-499F-9D8A-92CC4F84B253}"/>
+              </a:ext>
+            </a:extLst>
+          </p:cNvPr>
+          <p:cNvSpPr txBox="1"/>
+          <p:nvPr/>
+        </p:nvSpPr>
+        <p:spPr>
+          <a:xfrm>
+            <a:off x="658904" y="914261"/>
+            <a:ext cx="6306672" cy="4524315"/>
+          </a:xfrm>
+          <a:prstGeom prst="rect">
+            <a:avLst/>
+          </a:prstGeom>
+          <a:noFill/>
+        </p:spPr>
+        <p:txBody>
+          <a:bodyPr wrap="square" rtlCol="0">
+            <a:spAutoFit/>
+          </a:bodyPr>
+          <a:lstStyle/>
+          <a:p>
+            <a:r>
+              <a:rPr lang="en-US" altLang="zh-CN" dirty="0" err="1"/>
+              <a:t>cOctNode</a:t>
+            </a:r>
+            <a:r>
+              <a:rPr lang="en-US" altLang="zh-CN" dirty="0"/>
+              <a:t>::</a:t>
+            </a:r>
+            <a:r>
+              <a:rPr lang="en-US" altLang="zh-CN" dirty="0" err="1"/>
+              <a:t>calMshFaces</a:t>
+            </a:r>
+            <a:r>
+              <a:rPr lang="en-US" altLang="zh-CN" dirty="0"/>
+              <a:t>() would setup:</a:t>
+            </a:r>
+          </a:p>
+          <a:p>
+            <a:r>
+              <a:rPr lang="en-US" altLang="zh-CN" dirty="0"/>
+              <a:t>vector&lt;</a:t>
+            </a:r>
+            <a:r>
+              <a:rPr lang="en-US" altLang="zh-CN" dirty="0" err="1"/>
+              <a:t>cFace</a:t>
+            </a:r>
+            <a:r>
+              <a:rPr lang="en-US" altLang="zh-CN" dirty="0"/>
+              <a:t>&gt; </a:t>
+            </a:r>
+            <a:r>
+              <a:rPr lang="en-US" altLang="zh-CN" dirty="0" err="1"/>
+              <a:t>mshFacesList</a:t>
+            </a:r>
+            <a:r>
+              <a:rPr lang="en-US" altLang="zh-CN" dirty="0"/>
+              <a:t>[6] </a:t>
+            </a:r>
+          </a:p>
+          <a:p>
+            <a:r>
+              <a:rPr lang="en-US" altLang="zh-CN" dirty="0" err="1"/>
+              <a:t>cFace.low</a:t>
+            </a:r>
+            <a:r>
+              <a:rPr lang="en-US" altLang="zh-CN" dirty="0"/>
+              <a:t>, </a:t>
+            </a:r>
+            <a:r>
+              <a:rPr lang="en-US" altLang="zh-CN" dirty="0" err="1"/>
+              <a:t>cFace.upp</a:t>
+            </a:r>
+            <a:r>
+              <a:rPr lang="en-US" altLang="zh-CN" dirty="0"/>
+              <a:t>, </a:t>
+            </a:r>
+            <a:r>
+              <a:rPr lang="en-US" altLang="zh-CN" dirty="0" err="1"/>
+              <a:t>cFace.ptsList</a:t>
+            </a:r>
+            <a:r>
+              <a:rPr lang="en-US" altLang="zh-CN" dirty="0"/>
+              <a:t>,  </a:t>
+            </a:r>
+            <a:r>
+              <a:rPr lang="en-US" altLang="zh-CN" dirty="0" err="1"/>
+              <a:t>cFace.ptIndxList</a:t>
+            </a:r>
+            <a:endParaRPr lang="en-US" altLang="zh-CN" dirty="0"/>
+          </a:p>
+          <a:p>
+            <a:endParaRPr lang="en-US" altLang="zh-CN" dirty="0"/>
+          </a:p>
+          <a:p>
+            <a:r>
+              <a:rPr lang="en-US" altLang="zh-CN" dirty="0"/>
+              <a:t>This requires </a:t>
+            </a:r>
+            <a:r>
+              <a:rPr lang="en-US" altLang="zh-CN" dirty="0" err="1">
+                <a:solidFill>
+                  <a:srgbClr val="2B91AF"/>
+                </a:solidFill>
+                <a:latin typeface="Consolas" panose="020B0609020204030204" pitchFamily="49" charset="0"/>
+              </a:rPr>
+              <a:t>cOctree</a:t>
+            </a:r>
+            <a:r>
+              <a:rPr lang="en-US" altLang="zh-CN" dirty="0">
+                <a:solidFill>
+                  <a:srgbClr val="000000"/>
+                </a:solidFill>
+                <a:latin typeface="Consolas" panose="020B0609020204030204" pitchFamily="49" charset="0"/>
+              </a:rPr>
+              <a:t>::</a:t>
+            </a:r>
+            <a:r>
+              <a:rPr lang="en-US" altLang="zh-CN" dirty="0" err="1">
+                <a:solidFill>
+                  <a:srgbClr val="000000"/>
+                </a:solidFill>
+                <a:latin typeface="Consolas" panose="020B0609020204030204" pitchFamily="49" charset="0"/>
+              </a:rPr>
+              <a:t>setup_mshPtList</a:t>
+            </a:r>
+            <a:r>
+              <a:rPr lang="en-US" altLang="zh-CN" dirty="0">
+                <a:solidFill>
+                  <a:srgbClr val="000000"/>
+                </a:solidFill>
+                <a:latin typeface="Consolas" panose="020B0609020204030204" pitchFamily="49" charset="0"/>
+              </a:rPr>
+              <a:t>() </a:t>
+            </a:r>
+            <a:r>
+              <a:rPr lang="en-US" altLang="zh-CN" dirty="0"/>
+              <a:t>called first to setup: </a:t>
+            </a:r>
+          </a:p>
+          <a:p>
+            <a:r>
+              <a:rPr lang="en-US" altLang="zh-CN" dirty="0" err="1"/>
+              <a:t>mshPtsIndxList</a:t>
+            </a:r>
+            <a:r>
+              <a:rPr lang="en-US" altLang="zh-CN" dirty="0"/>
+              <a:t> because </a:t>
+            </a:r>
+            <a:r>
+              <a:rPr lang="en-US" altLang="zh-CN" dirty="0" err="1"/>
+              <a:t>cFace.ptIndxList</a:t>
+            </a:r>
+            <a:r>
+              <a:rPr lang="en-US" altLang="zh-CN" dirty="0"/>
+              <a:t> rely on it.</a:t>
+            </a:r>
+          </a:p>
+          <a:p>
+            <a:endParaRPr lang="en-US" altLang="zh-CN" dirty="0"/>
+          </a:p>
+          <a:p>
+            <a:r>
+              <a:rPr lang="en-US" altLang="zh-CN" dirty="0"/>
+              <a:t>Then, </a:t>
+            </a:r>
+            <a:r>
+              <a:rPr lang="en-US" altLang="zh-CN" dirty="0" err="1">
+                <a:solidFill>
+                  <a:srgbClr val="2B91AF"/>
+                </a:solidFill>
+                <a:latin typeface="Consolas" panose="020B0609020204030204" pitchFamily="49" charset="0"/>
+              </a:rPr>
+              <a:t>cOctree</a:t>
+            </a:r>
+            <a:r>
+              <a:rPr lang="en-US" altLang="zh-CN" dirty="0">
+                <a:solidFill>
+                  <a:srgbClr val="000000"/>
+                </a:solidFill>
+                <a:latin typeface="Consolas" panose="020B0609020204030204" pitchFamily="49" charset="0"/>
+              </a:rPr>
+              <a:t>::</a:t>
+            </a:r>
+            <a:r>
+              <a:rPr lang="en-US" altLang="zh-CN" dirty="0" err="1">
+                <a:solidFill>
+                  <a:srgbClr val="000000"/>
+                </a:solidFill>
+                <a:latin typeface="Consolas" panose="020B0609020204030204" pitchFamily="49" charset="0"/>
+              </a:rPr>
+              <a:t>setup_nodeMshFaces</a:t>
+            </a:r>
+            <a:r>
+              <a:rPr lang="en-US" altLang="zh-CN" dirty="0">
+                <a:solidFill>
+                  <a:srgbClr val="000000"/>
+                </a:solidFill>
+                <a:latin typeface="Consolas" panose="020B0609020204030204" pitchFamily="49" charset="0"/>
+              </a:rPr>
+              <a:t>() </a:t>
+            </a:r>
+            <a:r>
+              <a:rPr lang="en-US" altLang="zh-CN" dirty="0"/>
+              <a:t>can call:</a:t>
+            </a:r>
+          </a:p>
+          <a:p>
+            <a:r>
+              <a:rPr lang="en-US" altLang="zh-CN" dirty="0" err="1"/>
+              <a:t>calMshFaces</a:t>
+            </a:r>
+            <a:r>
+              <a:rPr lang="en-US" altLang="zh-CN" dirty="0"/>
+              <a:t>();</a:t>
+            </a:r>
+            <a:endParaRPr lang="zh-CN" altLang="en-US" dirty="0"/>
+          </a:p>
+          <a:p>
+            <a:endParaRPr lang="zh-CN" altLang="en-US" dirty="0"/>
+          </a:p>
+          <a:p>
+            <a:endParaRPr lang="en-US" altLang="zh-CN" dirty="0"/>
+          </a:p>
+          <a:p>
+            <a:endParaRPr lang="en-US" altLang="zh-CN" dirty="0"/>
+          </a:p>
+          <a:p>
+            <a:endParaRPr lang="en-US" altLang="zh-CN" dirty="0"/>
+          </a:p>
+          <a:p>
+            <a:endParaRPr lang="en-US" altLang="zh-CN" dirty="0"/>
+          </a:p>
+          <a:p>
+            <a:endParaRPr lang="zh-CN" altLang="en-US" dirty="0"/>
+          </a:p>
+        </p:txBody>
+      </p:sp>
+      <p:sp>
+        <p:nvSpPr>
+          <p:cNvPr id="7" name="矩形 6">
+            <a:extLst>
+              <a:ext uri="{FF2B5EF4-FFF2-40B4-BE49-F238E27FC236}">
+                <a16:creationId xmlns:a16="http://schemas.microsoft.com/office/drawing/2014/main" id="{5DA35146-D268-4848-9013-E519855E959B}"/>
+              </a:ext>
+            </a:extLst>
+          </p:cNvPr>
+          <p:cNvSpPr/>
+          <p:nvPr/>
+        </p:nvSpPr>
+        <p:spPr>
+          <a:xfrm>
+            <a:off x="410084" y="3429000"/>
+            <a:ext cx="311304" cy="369332"/>
+          </a:xfrm>
+          <a:prstGeom prst="rect">
+            <a:avLst/>
+          </a:prstGeom>
+        </p:spPr>
+        <p:txBody>
+          <a:bodyPr wrap="none">
+            <a:spAutoFit/>
+          </a:bodyPr>
+          <a:lstStyle/>
+          <a:p>
+            <a:r>
+              <a:rPr lang="en-US" altLang="zh-CN" dirty="0">
+                <a:solidFill>
+                  <a:srgbClr val="000000"/>
+                </a:solidFill>
+                <a:latin typeface="Consolas" panose="020B0609020204030204" pitchFamily="49" charset="0"/>
+              </a:rPr>
+              <a:t> </a:t>
+            </a:r>
+            <a:endParaRPr lang="zh-CN" altLang="en-US" dirty="0"/>
+          </a:p>
+        </p:txBody>
+      </p:sp>
+    </p:spTree>
+    <p:extLst>
+      <p:ext uri="{BB962C8B-B14F-4D97-AF65-F5344CB8AC3E}">
+        <p14:creationId xmlns:p14="http://schemas.microsoft.com/office/powerpoint/2010/main" val="4067646114"/>
       </p:ext>
     </p:extLst>
   </p:cSld>

</xml_diff>

<commit_message>
21 Dec 2020 SHZ Office
</commit_message>
<xml_diff>
--- a/etc/Octree_Machanism.pptx
+++ b/etc/Octree_Machanism.pptx
@@ -5,7 +5,7 @@
     <p:sldMasterId id="2147483648" r:id="rId1"/>
   </p:sldMasterIdLst>
   <p:notesMasterIdLst>
-    <p:notesMasterId r:id="rId13"/>
+    <p:notesMasterId r:id="rId14"/>
   </p:notesMasterIdLst>
   <p:sldIdLst>
     <p:sldId id="256" r:id="rId2"/>
@@ -19,6 +19,7 @@
     <p:sldId id="265" r:id="rId10"/>
     <p:sldId id="259" r:id="rId11"/>
     <p:sldId id="266" r:id="rId12"/>
+    <p:sldId id="267" r:id="rId13"/>
   </p:sldIdLst>
   <p:sldSz cx="12192000" cy="6858000"/>
   <p:notesSz cx="6858000" cy="9144000"/>
@@ -207,7 +208,7 @@
           <a:p>
             <a:fld id="{4A9EC5E2-9960-4CE5-BBF9-CC6A3A85A6BA}" type="datetimeFigureOut">
               <a:rPr lang="zh-CN" altLang="en-US" smtClean="0"/>
-              <a:t>2020/12/20</a:t>
+              <a:t>2020/12/21</a:t>
             </a:fld>
             <a:endParaRPr lang="zh-CN" altLang="en-US"/>
           </a:p>
@@ -705,7 +706,7 @@
           <a:p>
             <a:fld id="{117B3124-7878-45FD-A888-9101914B5913}" type="datetimeFigureOut">
               <a:rPr lang="zh-CN" altLang="en-US" smtClean="0"/>
-              <a:t>2020/12/20</a:t>
+              <a:t>2020/12/21</a:t>
             </a:fld>
             <a:endParaRPr lang="zh-CN" altLang="en-US"/>
           </a:p>
@@ -903,7 +904,7 @@
           <a:p>
             <a:fld id="{117B3124-7878-45FD-A888-9101914B5913}" type="datetimeFigureOut">
               <a:rPr lang="zh-CN" altLang="en-US" smtClean="0"/>
-              <a:t>2020/12/20</a:t>
+              <a:t>2020/12/21</a:t>
             </a:fld>
             <a:endParaRPr lang="zh-CN" altLang="en-US"/>
           </a:p>
@@ -1111,7 +1112,7 @@
           <a:p>
             <a:fld id="{117B3124-7878-45FD-A888-9101914B5913}" type="datetimeFigureOut">
               <a:rPr lang="zh-CN" altLang="en-US" smtClean="0"/>
-              <a:t>2020/12/20</a:t>
+              <a:t>2020/12/21</a:t>
             </a:fld>
             <a:endParaRPr lang="zh-CN" altLang="en-US"/>
           </a:p>
@@ -1309,7 +1310,7 @@
           <a:p>
             <a:fld id="{117B3124-7878-45FD-A888-9101914B5913}" type="datetimeFigureOut">
               <a:rPr lang="zh-CN" altLang="en-US" smtClean="0"/>
-              <a:t>2020/12/20</a:t>
+              <a:t>2020/12/21</a:t>
             </a:fld>
             <a:endParaRPr lang="zh-CN" altLang="en-US"/>
           </a:p>
@@ -1584,7 +1585,7 @@
           <a:p>
             <a:fld id="{117B3124-7878-45FD-A888-9101914B5913}" type="datetimeFigureOut">
               <a:rPr lang="zh-CN" altLang="en-US" smtClean="0"/>
-              <a:t>2020/12/20</a:t>
+              <a:t>2020/12/21</a:t>
             </a:fld>
             <a:endParaRPr lang="zh-CN" altLang="en-US"/>
           </a:p>
@@ -1849,7 +1850,7 @@
           <a:p>
             <a:fld id="{117B3124-7878-45FD-A888-9101914B5913}" type="datetimeFigureOut">
               <a:rPr lang="zh-CN" altLang="en-US" smtClean="0"/>
-              <a:t>2020/12/20</a:t>
+              <a:t>2020/12/21</a:t>
             </a:fld>
             <a:endParaRPr lang="zh-CN" altLang="en-US"/>
           </a:p>
@@ -2261,7 +2262,7 @@
           <a:p>
             <a:fld id="{117B3124-7878-45FD-A888-9101914B5913}" type="datetimeFigureOut">
               <a:rPr lang="zh-CN" altLang="en-US" smtClean="0"/>
-              <a:t>2020/12/20</a:t>
+              <a:t>2020/12/21</a:t>
             </a:fld>
             <a:endParaRPr lang="zh-CN" altLang="en-US"/>
           </a:p>
@@ -2402,7 +2403,7 @@
           <a:p>
             <a:fld id="{117B3124-7878-45FD-A888-9101914B5913}" type="datetimeFigureOut">
               <a:rPr lang="zh-CN" altLang="en-US" smtClean="0"/>
-              <a:t>2020/12/20</a:t>
+              <a:t>2020/12/21</a:t>
             </a:fld>
             <a:endParaRPr lang="zh-CN" altLang="en-US"/>
           </a:p>
@@ -2515,7 +2516,7 @@
           <a:p>
             <a:fld id="{117B3124-7878-45FD-A888-9101914B5913}" type="datetimeFigureOut">
               <a:rPr lang="zh-CN" altLang="en-US" smtClean="0"/>
-              <a:t>2020/12/20</a:t>
+              <a:t>2020/12/21</a:t>
             </a:fld>
             <a:endParaRPr lang="zh-CN" altLang="en-US"/>
           </a:p>
@@ -2826,7 +2827,7 @@
           <a:p>
             <a:fld id="{117B3124-7878-45FD-A888-9101914B5913}" type="datetimeFigureOut">
               <a:rPr lang="zh-CN" altLang="en-US" smtClean="0"/>
-              <a:t>2020/12/20</a:t>
+              <a:t>2020/12/21</a:t>
             </a:fld>
             <a:endParaRPr lang="zh-CN" altLang="en-US"/>
           </a:p>
@@ -3114,7 +3115,7 @@
           <a:p>
             <a:fld id="{117B3124-7878-45FD-A888-9101914B5913}" type="datetimeFigureOut">
               <a:rPr lang="zh-CN" altLang="en-US" smtClean="0"/>
-              <a:t>2020/12/20</a:t>
+              <a:t>2020/12/21</a:t>
             </a:fld>
             <a:endParaRPr lang="zh-CN" altLang="en-US"/>
           </a:p>
@@ -3355,7 +3356,7 @@
           <a:p>
             <a:fld id="{117B3124-7878-45FD-A888-9101914B5913}" type="datetimeFigureOut">
               <a:rPr lang="zh-CN" altLang="en-US" smtClean="0"/>
-              <a:t>2020/12/20</a:t>
+              <a:t>2020/12/21</a:t>
             </a:fld>
             <a:endParaRPr lang="zh-CN" altLang="en-US"/>
           </a:p>
@@ -5818,6 +5819,1055 @@
     <p:extLst>
       <p:ext uri="{BB962C8B-B14F-4D97-AF65-F5344CB8AC3E}">
         <p14:creationId xmlns:p14="http://schemas.microsoft.com/office/powerpoint/2010/main" val="4067646114"/>
+      </p:ext>
+    </p:extLst>
+  </p:cSld>
+  <p:clrMapOvr>
+    <a:masterClrMapping/>
+  </p:clrMapOvr>
+</p:sld>
+</file>
+
+<file path=ppt/slides/slide12.xml><?xml version="1.0" encoding="utf-8"?>
+<p:sld xmlns:a="http://schemas.openxmlformats.org/drawingml/2006/main" xmlns:r="http://schemas.openxmlformats.org/officeDocument/2006/relationships" xmlns:p="http://schemas.openxmlformats.org/presentationml/2006/main">
+  <p:cSld>
+    <p:spTree>
+      <p:nvGrpSpPr>
+        <p:cNvPr id="1" name=""/>
+        <p:cNvGrpSpPr/>
+        <p:nvPr/>
+      </p:nvGrpSpPr>
+      <p:grpSpPr>
+        <a:xfrm>
+          <a:off x="0" y="0"/>
+          <a:ext cx="0" cy="0"/>
+          <a:chOff x="0" y="0"/>
+          <a:chExt cx="0" cy="0"/>
+        </a:xfrm>
+      </p:grpSpPr>
+      <p:sp>
+        <p:nvSpPr>
+          <p:cNvPr id="6" name="文本框 5">
+            <a:extLst>
+              <a:ext uri="{FF2B5EF4-FFF2-40B4-BE49-F238E27FC236}">
+                <a16:creationId xmlns:a16="http://schemas.microsoft.com/office/drawing/2014/main" id="{A40BC1FA-F783-499F-9D8A-92CC4F84B253}"/>
+              </a:ext>
+            </a:extLst>
+          </p:cNvPr>
+          <p:cNvSpPr txBox="1"/>
+          <p:nvPr/>
+        </p:nvSpPr>
+        <p:spPr>
+          <a:xfrm>
+            <a:off x="313831" y="241281"/>
+            <a:ext cx="3059392" cy="6494085"/>
+          </a:xfrm>
+          <a:prstGeom prst="rect">
+            <a:avLst/>
+          </a:prstGeom>
+          <a:noFill/>
+        </p:spPr>
+        <p:txBody>
+          <a:bodyPr wrap="square" rtlCol="0">
+            <a:spAutoFit/>
+          </a:bodyPr>
+          <a:lstStyle/>
+          <a:p>
+            <a:r>
+              <a:rPr lang="en-US" altLang="zh-CN" sz="800" dirty="0"/>
+              <a:t>Class </a:t>
+            </a:r>
+            <a:r>
+              <a:rPr lang="en-US" altLang="zh-CN" sz="800" dirty="0" err="1"/>
+              <a:t>cFeaturePt</a:t>
+            </a:r>
+            <a:r>
+              <a:rPr lang="en-US" altLang="zh-CN" sz="800" dirty="0"/>
+              <a:t>{</a:t>
+            </a:r>
+          </a:p>
+          <a:p>
+            <a:endParaRPr lang="en-US" altLang="zh-CN" sz="800" dirty="0"/>
+          </a:p>
+          <a:p>
+            <a:r>
+              <a:rPr lang="en-US" altLang="zh-CN" sz="800" dirty="0"/>
+              <a:t>}</a:t>
+            </a:r>
+          </a:p>
+          <a:p>
+            <a:endParaRPr lang="en-US" altLang="zh-CN" sz="800" dirty="0"/>
+          </a:p>
+          <a:p>
+            <a:r>
+              <a:rPr lang="en-US" altLang="zh-CN" sz="800" dirty="0"/>
+              <a:t>Class </a:t>
+            </a:r>
+            <a:r>
+              <a:rPr lang="en-US" altLang="zh-CN" sz="800" dirty="0" err="1"/>
+              <a:t>cFeatureEdge</a:t>
+            </a:r>
+            <a:r>
+              <a:rPr lang="en-US" altLang="zh-CN" sz="800" dirty="0"/>
+              <a:t>{</a:t>
+            </a:r>
+          </a:p>
+          <a:p>
+            <a:endParaRPr lang="en-US" altLang="zh-CN" sz="800" dirty="0"/>
+          </a:p>
+          <a:p>
+            <a:r>
+              <a:rPr lang="en-US" altLang="zh-CN" sz="800" dirty="0"/>
+              <a:t>}</a:t>
+            </a:r>
+          </a:p>
+          <a:p>
+            <a:endParaRPr lang="en-US" altLang="zh-CN" sz="800" dirty="0"/>
+          </a:p>
+          <a:p>
+            <a:r>
+              <a:rPr lang="en-US" altLang="zh-CN" sz="800" dirty="0"/>
+              <a:t>Class </a:t>
+            </a:r>
+            <a:r>
+              <a:rPr lang="en-US" altLang="zh-CN" sz="800" dirty="0" err="1"/>
+              <a:t>cTri</a:t>
+            </a:r>
+            <a:r>
+              <a:rPr lang="en-US" altLang="zh-CN" sz="800" dirty="0"/>
+              <a:t>{</a:t>
+            </a:r>
+          </a:p>
+          <a:p>
+            <a:endParaRPr lang="en-US" altLang="zh-CN" sz="800" dirty="0"/>
+          </a:p>
+          <a:p>
+            <a:r>
+              <a:rPr lang="en-US" altLang="zh-CN" sz="800" dirty="0"/>
+              <a:t>}</a:t>
+            </a:r>
+          </a:p>
+          <a:p>
+            <a:endParaRPr lang="en-US" altLang="zh-CN" sz="800" dirty="0"/>
+          </a:p>
+          <a:p>
+            <a:r>
+              <a:rPr lang="en-US" altLang="zh-CN" sz="800" dirty="0"/>
+              <a:t>Class </a:t>
+            </a:r>
+            <a:r>
+              <a:rPr lang="en-US" altLang="zh-CN" sz="800" dirty="0" err="1"/>
+              <a:t>cLine</a:t>
+            </a:r>
+            <a:r>
+              <a:rPr lang="en-US" altLang="zh-CN" sz="800" dirty="0"/>
+              <a:t>{</a:t>
+            </a:r>
+          </a:p>
+          <a:p>
+            <a:endParaRPr lang="en-US" altLang="zh-CN" sz="800" dirty="0"/>
+          </a:p>
+          <a:p>
+            <a:r>
+              <a:rPr lang="en-US" altLang="zh-CN" sz="800" dirty="0"/>
+              <a:t>}</a:t>
+            </a:r>
+          </a:p>
+          <a:p>
+            <a:endParaRPr lang="en-US" altLang="zh-CN" sz="800" dirty="0"/>
+          </a:p>
+          <a:p>
+            <a:r>
+              <a:rPr lang="en-US" altLang="zh-CN" sz="800" dirty="0"/>
+              <a:t>Class </a:t>
+            </a:r>
+            <a:r>
+              <a:rPr lang="en-US" altLang="zh-CN" sz="800" dirty="0" err="1"/>
+              <a:t>cOctNode</a:t>
+            </a:r>
+            <a:r>
+              <a:rPr lang="en-US" altLang="zh-CN" sz="800" dirty="0"/>
+              <a:t>{</a:t>
+            </a:r>
+          </a:p>
+          <a:p>
+            <a:r>
+              <a:rPr lang="en-US" altLang="zh-CN" sz="800" dirty="0"/>
+              <a:t>Parent, children</a:t>
+            </a:r>
+          </a:p>
+          <a:p>
+            <a:r>
+              <a:rPr lang="en-US" altLang="zh-CN" sz="800" dirty="0"/>
+              <a:t>vector&lt;</a:t>
+            </a:r>
+            <a:r>
+              <a:rPr lang="en-US" altLang="zh-CN" sz="800" dirty="0" err="1"/>
+              <a:t>cTri</a:t>
+            </a:r>
+            <a:r>
+              <a:rPr lang="en-US" altLang="zh-CN" sz="800" dirty="0"/>
+              <a:t>*&gt; </a:t>
+            </a:r>
+            <a:r>
+              <a:rPr lang="en-US" altLang="zh-CN" sz="800" dirty="0" err="1"/>
+              <a:t>geoFFacesList</a:t>
+            </a:r>
+            <a:r>
+              <a:rPr lang="en-US" altLang="zh-CN" sz="800" dirty="0"/>
+              <a:t>; //</a:t>
+            </a:r>
+            <a:r>
+              <a:rPr lang="en-US" altLang="zh-CN" sz="800" dirty="0" err="1"/>
+              <a:t>geom</a:t>
+            </a:r>
+            <a:r>
+              <a:rPr lang="en-US" altLang="zh-CN" sz="800" dirty="0"/>
+              <a:t> feature faces list</a:t>
+            </a:r>
+          </a:p>
+          <a:p>
+            <a:r>
+              <a:rPr lang="en-US" altLang="zh-CN" sz="800" dirty="0"/>
+              <a:t>vector&lt;</a:t>
+            </a:r>
+            <a:r>
+              <a:rPr lang="en-US" altLang="zh-CN" sz="800" dirty="0" err="1"/>
+              <a:t>cFeaturePt</a:t>
+            </a:r>
+            <a:r>
+              <a:rPr lang="en-US" altLang="zh-CN" sz="800" dirty="0"/>
+              <a:t>*&gt; </a:t>
+            </a:r>
+            <a:r>
+              <a:rPr lang="en-US" altLang="zh-CN" sz="800" dirty="0" err="1"/>
+              <a:t>geoFPtsList</a:t>
+            </a:r>
+            <a:r>
+              <a:rPr lang="en-US" altLang="zh-CN" sz="800" dirty="0"/>
+              <a:t>; //</a:t>
+            </a:r>
+            <a:r>
+              <a:rPr lang="en-US" altLang="zh-CN" sz="800" dirty="0" err="1"/>
+              <a:t>geom</a:t>
+            </a:r>
+            <a:r>
+              <a:rPr lang="en-US" altLang="zh-CN" sz="800" dirty="0"/>
+              <a:t> feature pts list</a:t>
+            </a:r>
+          </a:p>
+          <a:p>
+            <a:r>
+              <a:rPr lang="en-US" altLang="zh-CN" sz="800" dirty="0"/>
+              <a:t>vector&lt;</a:t>
+            </a:r>
+            <a:r>
+              <a:rPr lang="en-US" altLang="zh-CN" sz="800" dirty="0" err="1"/>
+              <a:t>cFeatureEdge</a:t>
+            </a:r>
+            <a:r>
+              <a:rPr lang="en-US" altLang="zh-CN" sz="800" dirty="0"/>
+              <a:t>*&gt; </a:t>
+            </a:r>
+            <a:r>
+              <a:rPr lang="en-US" altLang="zh-CN" sz="800" dirty="0" err="1"/>
+              <a:t>geoFEdgesList</a:t>
+            </a:r>
+            <a:r>
+              <a:rPr lang="en-US" altLang="zh-CN" sz="800" dirty="0"/>
+              <a:t>; //</a:t>
+            </a:r>
+            <a:r>
+              <a:rPr lang="en-US" altLang="zh-CN" sz="800" dirty="0" err="1"/>
+              <a:t>geom</a:t>
+            </a:r>
+            <a:r>
+              <a:rPr lang="en-US" altLang="zh-CN" sz="800" dirty="0"/>
+              <a:t> feature edges list</a:t>
+            </a:r>
+          </a:p>
+          <a:p>
+            <a:r>
+              <a:rPr lang="en-US" altLang="zh-CN" sz="800" dirty="0"/>
+              <a:t>}</a:t>
+            </a:r>
+          </a:p>
+          <a:p>
+            <a:endParaRPr lang="en-US" altLang="zh-CN" sz="800" dirty="0"/>
+          </a:p>
+          <a:p>
+            <a:r>
+              <a:rPr lang="en-US" altLang="zh-CN" sz="800" dirty="0"/>
+              <a:t>Class </a:t>
+            </a:r>
+            <a:r>
+              <a:rPr lang="en-US" altLang="zh-CN" sz="800" dirty="0" err="1"/>
+              <a:t>cOctree</a:t>
+            </a:r>
+            <a:r>
+              <a:rPr lang="en-US" altLang="zh-CN" sz="800" dirty="0"/>
+              <a:t>{</a:t>
+            </a:r>
+          </a:p>
+          <a:p>
+            <a:r>
+              <a:rPr lang="en-US" altLang="zh-CN" sz="800" dirty="0" err="1"/>
+              <a:t>cOctNode</a:t>
+            </a:r>
+            <a:r>
+              <a:rPr lang="en-US" altLang="zh-CN" sz="800" dirty="0"/>
+              <a:t> root, depth</a:t>
+            </a:r>
+          </a:p>
+          <a:p>
+            <a:r>
+              <a:rPr lang="en-US" altLang="zh-CN" sz="800" dirty="0" err="1"/>
+              <a:t>setup_root</a:t>
+            </a:r>
+            <a:r>
+              <a:rPr lang="en-US" altLang="zh-CN" sz="800" dirty="0"/>
+              <a:t>();</a:t>
+            </a:r>
+          </a:p>
+          <a:p>
+            <a:r>
+              <a:rPr lang="en-US" altLang="zh-CN" sz="800" dirty="0"/>
+              <a:t>balance()</a:t>
+            </a:r>
+          </a:p>
+          <a:p>
+            <a:r>
+              <a:rPr lang="en-US" altLang="zh-CN" sz="800" dirty="0" err="1"/>
+              <a:t>splitOctree</a:t>
+            </a:r>
+            <a:r>
+              <a:rPr lang="en-US" altLang="zh-CN" sz="800" dirty="0"/>
+              <a:t>()</a:t>
+            </a:r>
+          </a:p>
+          <a:p>
+            <a:r>
+              <a:rPr lang="en-US" altLang="zh-CN" sz="800" dirty="0"/>
+              <a:t>}</a:t>
+            </a:r>
+          </a:p>
+          <a:p>
+            <a:endParaRPr lang="en-US" altLang="zh-CN" sz="800" dirty="0"/>
+          </a:p>
+          <a:p>
+            <a:r>
+              <a:rPr lang="en-US" altLang="zh-CN" sz="800" dirty="0"/>
+              <a:t> Class </a:t>
+            </a:r>
+            <a:r>
+              <a:rPr lang="en-US" altLang="zh-CN" sz="800" dirty="0" err="1"/>
+              <a:t>cOctreeUtil</a:t>
+            </a:r>
+            <a:r>
+              <a:rPr lang="en-US" altLang="zh-CN" sz="800" dirty="0"/>
+              <a:t>{</a:t>
+            </a:r>
+          </a:p>
+          <a:p>
+            <a:r>
+              <a:rPr lang="en-US" altLang="zh-CN" sz="800" dirty="0" err="1"/>
+              <a:t>output_geoFPtsList</a:t>
+            </a:r>
+            <a:r>
+              <a:rPr lang="en-US" altLang="zh-CN" sz="800" dirty="0"/>
+              <a:t>(vector&lt;</a:t>
+            </a:r>
+            <a:r>
+              <a:rPr lang="en-US" altLang="zh-CN" sz="800" dirty="0" err="1"/>
+              <a:t>cFeaturePt</a:t>
+            </a:r>
+            <a:r>
+              <a:rPr lang="en-US" altLang="zh-CN" sz="800" dirty="0"/>
+              <a:t>*&gt;&amp; </a:t>
+            </a:r>
+            <a:r>
+              <a:rPr lang="en-US" altLang="zh-CN" sz="800" dirty="0" err="1"/>
+              <a:t>geoFPtsList</a:t>
+            </a:r>
+            <a:r>
+              <a:rPr lang="en-US" altLang="zh-CN" sz="800" dirty="0"/>
+              <a:t>, vector&lt;vector&lt;double&gt; &gt;&amp; geoPts3DList)</a:t>
+            </a:r>
+          </a:p>
+          <a:p>
+            <a:endParaRPr lang="en-US" altLang="zh-CN" sz="800" dirty="0"/>
+          </a:p>
+          <a:p>
+            <a:r>
+              <a:rPr lang="en-US" altLang="zh-CN" sz="800" dirty="0" err="1"/>
+              <a:t>output_octree</a:t>
+            </a:r>
+            <a:r>
+              <a:rPr lang="en-US" altLang="zh-CN" sz="800" dirty="0"/>
+              <a:t>(const char* _</a:t>
+            </a:r>
+            <a:r>
+              <a:rPr lang="en-US" altLang="zh-CN" sz="800" dirty="0" err="1"/>
+              <a:t>fileName</a:t>
+            </a:r>
+            <a:r>
+              <a:rPr lang="en-US" altLang="zh-CN" sz="800" dirty="0"/>
+              <a:t>, </a:t>
+            </a:r>
+            <a:r>
+              <a:rPr lang="en-US" altLang="zh-CN" sz="800" dirty="0" err="1"/>
+              <a:t>cOctree</a:t>
+            </a:r>
+            <a:r>
+              <a:rPr lang="en-US" altLang="zh-CN" sz="800" dirty="0"/>
+              <a:t>* tree)</a:t>
+            </a:r>
+          </a:p>
+          <a:p>
+            <a:r>
+              <a:rPr lang="en-US" altLang="zh-CN" sz="800" dirty="0"/>
+              <a:t>}</a:t>
+            </a:r>
+          </a:p>
+          <a:p>
+            <a:endParaRPr lang="en-US" altLang="zh-CN" sz="800" dirty="0"/>
+          </a:p>
+          <a:p>
+            <a:endParaRPr lang="en-US" altLang="zh-CN" sz="800" dirty="0"/>
+          </a:p>
+          <a:p>
+            <a:endParaRPr lang="en-US" altLang="zh-CN" sz="800" dirty="0"/>
+          </a:p>
+          <a:p>
+            <a:r>
+              <a:rPr lang="en-US" altLang="zh-CN" sz="800" dirty="0"/>
+              <a:t>Class </a:t>
+            </a:r>
+            <a:r>
+              <a:rPr lang="en-US" altLang="zh-CN" sz="800" dirty="0" err="1"/>
+              <a:t>cGeomData</a:t>
+            </a:r>
+            <a:r>
+              <a:rPr lang="en-US" altLang="zh-CN" sz="800" dirty="0"/>
+              <a:t>{</a:t>
+            </a:r>
+          </a:p>
+          <a:p>
+            <a:endParaRPr lang="en-US" altLang="zh-CN" sz="800" dirty="0"/>
+          </a:p>
+          <a:p>
+            <a:r>
+              <a:rPr lang="en-US" altLang="zh-CN" sz="800" dirty="0"/>
+              <a:t>}</a:t>
+            </a:r>
+          </a:p>
+          <a:p>
+            <a:endParaRPr lang="en-US" altLang="zh-CN" sz="800" dirty="0"/>
+          </a:p>
+          <a:p>
+            <a:endParaRPr lang="en-US" altLang="zh-CN" sz="800" dirty="0"/>
+          </a:p>
+          <a:p>
+            <a:r>
+              <a:rPr lang="en-US" altLang="zh-CN" sz="800" dirty="0"/>
+              <a:t>Class </a:t>
+            </a:r>
+            <a:r>
+              <a:rPr lang="en-US" altLang="zh-CN" sz="800" dirty="0" err="1"/>
+              <a:t>cFace</a:t>
+            </a:r>
+            <a:r>
+              <a:rPr lang="en-US" altLang="zh-CN" sz="800" dirty="0"/>
+              <a:t>{</a:t>
+            </a:r>
+          </a:p>
+          <a:p>
+            <a:endParaRPr lang="en-US" altLang="zh-CN" sz="800" dirty="0"/>
+          </a:p>
+          <a:p>
+            <a:r>
+              <a:rPr lang="en-US" altLang="zh-CN" sz="800" dirty="0"/>
+              <a:t>}</a:t>
+            </a:r>
+          </a:p>
+          <a:p>
+            <a:endParaRPr lang="en-US" altLang="zh-CN" sz="800" dirty="0"/>
+          </a:p>
+          <a:p>
+            <a:r>
+              <a:rPr lang="en-US" altLang="zh-CN" sz="800" dirty="0"/>
+              <a:t>Class </a:t>
+            </a:r>
+            <a:r>
+              <a:rPr lang="en-US" altLang="zh-CN" sz="800" dirty="0" err="1"/>
+              <a:t>cBoundary</a:t>
+            </a:r>
+            <a:r>
+              <a:rPr lang="en-US" altLang="zh-CN" sz="800" dirty="0"/>
+              <a:t>{</a:t>
+            </a:r>
+          </a:p>
+          <a:p>
+            <a:endParaRPr lang="en-US" altLang="zh-CN" sz="800" dirty="0"/>
+          </a:p>
+          <a:p>
+            <a:r>
+              <a:rPr lang="en-US" altLang="zh-CN" sz="800" dirty="0"/>
+              <a:t>}</a:t>
+            </a:r>
+          </a:p>
+          <a:p>
+            <a:endParaRPr lang="zh-CN" altLang="en-US" sz="800" dirty="0"/>
+          </a:p>
+        </p:txBody>
+      </p:sp>
+      <p:sp>
+        <p:nvSpPr>
+          <p:cNvPr id="7" name="矩形 6">
+            <a:extLst>
+              <a:ext uri="{FF2B5EF4-FFF2-40B4-BE49-F238E27FC236}">
+                <a16:creationId xmlns:a16="http://schemas.microsoft.com/office/drawing/2014/main" id="{5DA35146-D268-4848-9013-E519855E959B}"/>
+              </a:ext>
+            </a:extLst>
+          </p:cNvPr>
+          <p:cNvSpPr/>
+          <p:nvPr/>
+        </p:nvSpPr>
+        <p:spPr>
+          <a:xfrm>
+            <a:off x="410084" y="3429000"/>
+            <a:ext cx="311304" cy="369332"/>
+          </a:xfrm>
+          <a:prstGeom prst="rect">
+            <a:avLst/>
+          </a:prstGeom>
+        </p:spPr>
+        <p:txBody>
+          <a:bodyPr wrap="none">
+            <a:spAutoFit/>
+          </a:bodyPr>
+          <a:lstStyle/>
+          <a:p>
+            <a:r>
+              <a:rPr lang="en-US" altLang="zh-CN" dirty="0">
+                <a:solidFill>
+                  <a:srgbClr val="000000"/>
+                </a:solidFill>
+                <a:latin typeface="Consolas" panose="020B0609020204030204" pitchFamily="49" charset="0"/>
+              </a:rPr>
+              <a:t> </a:t>
+            </a:r>
+            <a:endParaRPr lang="zh-CN" altLang="en-US" dirty="0"/>
+          </a:p>
+        </p:txBody>
+      </p:sp>
+      <p:sp>
+        <p:nvSpPr>
+          <p:cNvPr id="2" name="矩形 1">
+            <a:extLst>
+              <a:ext uri="{FF2B5EF4-FFF2-40B4-BE49-F238E27FC236}">
+                <a16:creationId xmlns:a16="http://schemas.microsoft.com/office/drawing/2014/main" id="{169CCC7E-9D21-4E57-9E1C-C9E9664ECB24}"/>
+              </a:ext>
+            </a:extLst>
+          </p:cNvPr>
+          <p:cNvSpPr/>
+          <p:nvPr/>
+        </p:nvSpPr>
+        <p:spPr>
+          <a:xfrm>
+            <a:off x="8887326" y="244967"/>
+            <a:ext cx="3304674" cy="1077218"/>
+          </a:xfrm>
+          <a:prstGeom prst="rect">
+            <a:avLst/>
+          </a:prstGeom>
+        </p:spPr>
+        <p:txBody>
+          <a:bodyPr wrap="square">
+            <a:spAutoFit/>
+          </a:bodyPr>
+          <a:lstStyle/>
+          <a:p>
+            <a:r>
+              <a:rPr lang="en-US" altLang="zh-CN" sz="800" dirty="0"/>
+              <a:t>Main(){</a:t>
+            </a:r>
+          </a:p>
+          <a:p>
+            <a:r>
+              <a:rPr lang="en-US" altLang="zh-CN" sz="800" dirty="0"/>
+              <a:t>App=New </a:t>
+            </a:r>
+            <a:r>
+              <a:rPr lang="en-US" altLang="zh-CN" sz="800" dirty="0" err="1"/>
+              <a:t>octreeApp</a:t>
+            </a:r>
+            <a:r>
+              <a:rPr lang="en-US" altLang="zh-CN" sz="800" dirty="0"/>
+              <a:t>()</a:t>
+            </a:r>
+          </a:p>
+          <a:p>
+            <a:r>
+              <a:rPr lang="en-US" altLang="zh-CN" sz="800" dirty="0" err="1"/>
+              <a:t>App.readSTL</a:t>
+            </a:r>
+            <a:r>
+              <a:rPr lang="en-US" altLang="zh-CN" sz="800" dirty="0"/>
+              <a:t>()</a:t>
+            </a:r>
+          </a:p>
+          <a:p>
+            <a:r>
+              <a:rPr lang="en-US" altLang="zh-CN" sz="800" dirty="0" err="1"/>
+              <a:t>App.defineBody</a:t>
+            </a:r>
+            <a:r>
+              <a:rPr lang="en-US" altLang="zh-CN" sz="800" dirty="0"/>
+              <a:t>(x, y, z)</a:t>
+            </a:r>
+          </a:p>
+          <a:p>
+            <a:r>
+              <a:rPr lang="en-US" altLang="zh-CN" sz="800" dirty="0" err="1"/>
+              <a:t>App.setupMeshSize</a:t>
+            </a:r>
+            <a:r>
+              <a:rPr lang="en-US" altLang="zh-CN" sz="800" dirty="0"/>
+              <a:t>(int, int, int)</a:t>
+            </a:r>
+          </a:p>
+          <a:p>
+            <a:r>
+              <a:rPr lang="en-US" altLang="zh-CN" sz="800" dirty="0" err="1"/>
+              <a:t>App.buildOctree</a:t>
+            </a:r>
+            <a:r>
+              <a:rPr lang="en-US" altLang="zh-CN" sz="800" dirty="0"/>
+              <a:t>()</a:t>
+            </a:r>
+          </a:p>
+          <a:p>
+            <a:r>
+              <a:rPr lang="en-US" altLang="zh-CN" sz="800" dirty="0" err="1"/>
+              <a:t>App.saveAsOFMesh</a:t>
+            </a:r>
+            <a:r>
+              <a:rPr lang="en-US" altLang="zh-CN" sz="800" dirty="0"/>
+              <a:t>()</a:t>
+            </a:r>
+          </a:p>
+          <a:p>
+            <a:r>
+              <a:rPr lang="en-US" altLang="zh-CN" sz="800" dirty="0"/>
+              <a:t>}</a:t>
+            </a:r>
+          </a:p>
+        </p:txBody>
+      </p:sp>
+      <p:sp>
+        <p:nvSpPr>
+          <p:cNvPr id="3" name="矩形 2">
+            <a:extLst>
+              <a:ext uri="{FF2B5EF4-FFF2-40B4-BE49-F238E27FC236}">
+                <a16:creationId xmlns:a16="http://schemas.microsoft.com/office/drawing/2014/main" id="{AB88DB44-8713-47F5-B102-362B17E4584B}"/>
+              </a:ext>
+            </a:extLst>
+          </p:cNvPr>
+          <p:cNvSpPr/>
+          <p:nvPr/>
+        </p:nvSpPr>
+        <p:spPr>
+          <a:xfrm>
+            <a:off x="4098757" y="76849"/>
+            <a:ext cx="3569368" cy="1569660"/>
+          </a:xfrm>
+          <a:prstGeom prst="rect">
+            <a:avLst/>
+          </a:prstGeom>
+        </p:spPr>
+        <p:txBody>
+          <a:bodyPr wrap="square">
+            <a:spAutoFit/>
+          </a:bodyPr>
+          <a:lstStyle/>
+          <a:p>
+            <a:r>
+              <a:rPr lang="en-US" altLang="zh-CN" sz="800" dirty="0"/>
+              <a:t>Class </a:t>
+            </a:r>
+            <a:r>
+              <a:rPr lang="en-US" altLang="zh-CN" sz="800" dirty="0" err="1"/>
+              <a:t>OctreeApp</a:t>
+            </a:r>
+            <a:r>
+              <a:rPr lang="en-US" altLang="zh-CN" sz="800" dirty="0"/>
+              <a:t>{</a:t>
+            </a:r>
+          </a:p>
+          <a:p>
+            <a:r>
+              <a:rPr lang="en-US" altLang="zh-CN" sz="800" dirty="0"/>
+              <a:t>MAX_OCTREE_LEVELS = 6;</a:t>
+            </a:r>
+          </a:p>
+          <a:p>
+            <a:r>
+              <a:rPr lang="en-US" altLang="zh-CN" sz="800" dirty="0"/>
+              <a:t>MIN_OCTREE_LEVELS = 5;</a:t>
+            </a:r>
+          </a:p>
+          <a:p>
+            <a:r>
+              <a:rPr lang="en-US" altLang="zh-CN" sz="800" dirty="0"/>
+              <a:t>MAX_OCTNODE_FEATS = 5;</a:t>
+            </a:r>
+          </a:p>
+          <a:p>
+            <a:r>
+              <a:rPr lang="en-US" altLang="zh-CN" sz="800" dirty="0" err="1"/>
+              <a:t>cOctree</a:t>
+            </a:r>
+            <a:r>
+              <a:rPr lang="en-US" altLang="zh-CN" sz="800" dirty="0"/>
+              <a:t> octree</a:t>
+            </a:r>
+          </a:p>
+          <a:p>
+            <a:r>
+              <a:rPr lang="en-US" altLang="zh-CN" sz="800" dirty="0" err="1"/>
+              <a:t>readSTL</a:t>
+            </a:r>
+            <a:r>
+              <a:rPr lang="en-US" altLang="zh-CN" sz="800" dirty="0"/>
+              <a:t>()</a:t>
+            </a:r>
+          </a:p>
+          <a:p>
+            <a:r>
+              <a:rPr lang="en-US" altLang="zh-CN" sz="800" dirty="0" err="1"/>
+              <a:t>defineBody</a:t>
+            </a:r>
+            <a:r>
+              <a:rPr lang="en-US" altLang="zh-CN" sz="800" dirty="0"/>
+              <a:t>(x, y, z)</a:t>
+            </a:r>
+          </a:p>
+          <a:p>
+            <a:r>
+              <a:rPr lang="en-US" altLang="zh-CN" sz="800" dirty="0" err="1"/>
+              <a:t>defineBody</a:t>
+            </a:r>
+            <a:r>
+              <a:rPr lang="en-US" altLang="zh-CN" sz="800" dirty="0"/>
+              <a:t>()</a:t>
+            </a:r>
+          </a:p>
+          <a:p>
+            <a:r>
+              <a:rPr lang="en-US" altLang="zh-CN" sz="800" dirty="0" err="1"/>
+              <a:t>setupMeshSize</a:t>
+            </a:r>
+            <a:r>
+              <a:rPr lang="en-US" altLang="zh-CN" sz="800" dirty="0"/>
+              <a:t>(int, int, int)</a:t>
+            </a:r>
+          </a:p>
+          <a:p>
+            <a:r>
+              <a:rPr lang="en-US" altLang="zh-CN" sz="800" dirty="0" err="1"/>
+              <a:t>buildOctree</a:t>
+            </a:r>
+            <a:r>
+              <a:rPr lang="en-US" altLang="zh-CN" sz="800" dirty="0"/>
+              <a:t>()</a:t>
+            </a:r>
+          </a:p>
+          <a:p>
+            <a:r>
+              <a:rPr lang="en-US" altLang="zh-CN" sz="800" dirty="0" err="1"/>
+              <a:t>saveAsOFMesh</a:t>
+            </a:r>
+            <a:r>
+              <a:rPr lang="en-US" altLang="zh-CN" sz="800" dirty="0"/>
+              <a:t>()</a:t>
+            </a:r>
+          </a:p>
+          <a:p>
+            <a:r>
+              <a:rPr lang="en-US" altLang="zh-CN" sz="800" dirty="0"/>
+              <a:t>}</a:t>
+            </a:r>
+          </a:p>
+        </p:txBody>
+      </p:sp>
+      <p:sp>
+        <p:nvSpPr>
+          <p:cNvPr id="4" name="矩形 3">
+            <a:extLst>
+              <a:ext uri="{FF2B5EF4-FFF2-40B4-BE49-F238E27FC236}">
+                <a16:creationId xmlns:a16="http://schemas.microsoft.com/office/drawing/2014/main" id="{6BD0A6AE-A21D-4AAB-8F66-E87D69FCF3D0}"/>
+              </a:ext>
+            </a:extLst>
+          </p:cNvPr>
+          <p:cNvSpPr/>
+          <p:nvPr/>
+        </p:nvSpPr>
+        <p:spPr>
+          <a:xfrm>
+            <a:off x="4098757" y="1891571"/>
+            <a:ext cx="7120860" cy="1815882"/>
+          </a:xfrm>
+          <a:prstGeom prst="rect">
+            <a:avLst/>
+          </a:prstGeom>
+        </p:spPr>
+        <p:txBody>
+          <a:bodyPr wrap="none">
+            <a:spAutoFit/>
+          </a:bodyPr>
+          <a:lstStyle/>
+          <a:p>
+            <a:r>
+              <a:rPr lang="en-US" altLang="zh-CN" sz="800" dirty="0" err="1"/>
+              <a:t>buildOctree</a:t>
+            </a:r>
+            <a:r>
+              <a:rPr lang="en-US" altLang="zh-CN" sz="800" dirty="0"/>
+              <a:t>(){</a:t>
+            </a:r>
+          </a:p>
+          <a:p>
+            <a:r>
+              <a:rPr lang="en-US" altLang="zh-CN" sz="800" dirty="0"/>
+              <a:t>    </a:t>
+            </a:r>
+            <a:r>
+              <a:rPr lang="en-US" altLang="zh-CN" sz="800" dirty="0" err="1"/>
+              <a:t>octree.setup_root</a:t>
+            </a:r>
+            <a:r>
+              <a:rPr lang="en-US" altLang="zh-CN" sz="800" dirty="0"/>
+              <a:t>();</a:t>
+            </a:r>
+          </a:p>
+          <a:p>
+            <a:r>
+              <a:rPr lang="en-US" altLang="zh-CN" sz="800" dirty="0"/>
+              <a:t>    </a:t>
+            </a:r>
+            <a:r>
+              <a:rPr lang="en-US" altLang="zh-CN" sz="800" dirty="0" err="1"/>
+              <a:t>octree.splitOctreeByMinLevel</a:t>
+            </a:r>
+            <a:r>
+              <a:rPr lang="en-US" altLang="zh-CN" sz="800" dirty="0"/>
+              <a:t>(</a:t>
+            </a:r>
+            <a:r>
+              <a:rPr lang="en-US" altLang="zh-CN" sz="800" dirty="0" err="1"/>
+              <a:t>cOctNode</a:t>
+            </a:r>
+            <a:r>
+              <a:rPr lang="en-US" altLang="zh-CN" sz="800" dirty="0"/>
+              <a:t> &amp;node);</a:t>
+            </a:r>
+          </a:p>
+          <a:p>
+            <a:r>
+              <a:rPr lang="en-US" altLang="zh-CN" sz="800" dirty="0"/>
+              <a:t>    </a:t>
+            </a:r>
+            <a:r>
+              <a:rPr lang="en-US" altLang="zh-CN" sz="800" dirty="0" err="1"/>
+              <a:t>octree.splitOctreeByFeaturePt</a:t>
+            </a:r>
+            <a:r>
+              <a:rPr lang="en-US" altLang="zh-CN" sz="800" dirty="0"/>
+              <a:t>(</a:t>
+            </a:r>
+            <a:r>
+              <a:rPr lang="en-US" altLang="zh-CN" sz="800" dirty="0" err="1"/>
+              <a:t>cOctNode</a:t>
+            </a:r>
+            <a:r>
+              <a:rPr lang="en-US" altLang="zh-CN" sz="800" dirty="0"/>
+              <a:t> &amp;node);</a:t>
+            </a:r>
+          </a:p>
+          <a:p>
+            <a:r>
+              <a:rPr lang="en-US" altLang="zh-CN" sz="800" dirty="0"/>
+              <a:t>    </a:t>
+            </a:r>
+            <a:r>
+              <a:rPr lang="en-US" altLang="zh-CN" sz="800" dirty="0" err="1"/>
+              <a:t>octree.setup_leafNodesList</a:t>
+            </a:r>
+            <a:r>
+              <a:rPr lang="en-US" altLang="zh-CN" sz="800" dirty="0"/>
+              <a:t>(</a:t>
+            </a:r>
+            <a:r>
+              <a:rPr lang="en-US" altLang="zh-CN" sz="800" dirty="0" err="1"/>
+              <a:t>cOctNode</a:t>
+            </a:r>
+            <a:r>
+              <a:rPr lang="en-US" altLang="zh-CN" sz="800" dirty="0"/>
+              <a:t>* node);</a:t>
+            </a:r>
+          </a:p>
+          <a:p>
+            <a:r>
+              <a:rPr lang="en-US" altLang="zh-CN" sz="800" dirty="0"/>
+              <a:t>    </a:t>
+            </a:r>
+            <a:r>
+              <a:rPr lang="en-US" altLang="zh-CN" sz="800" dirty="0" err="1"/>
+              <a:t>octree.setup_leafNodesNbr</a:t>
+            </a:r>
+            <a:r>
+              <a:rPr lang="en-US" altLang="zh-CN" sz="800" dirty="0"/>
+              <a:t>();</a:t>
+            </a:r>
+          </a:p>
+          <a:p>
+            <a:r>
+              <a:rPr lang="en-US" altLang="zh-CN" sz="800" dirty="0"/>
+              <a:t>    </a:t>
+            </a:r>
+            <a:r>
+              <a:rPr lang="en-US" altLang="zh-CN" sz="800" dirty="0" err="1"/>
+              <a:t>octree.identifyNodes</a:t>
+            </a:r>
+            <a:r>
+              <a:rPr lang="en-US" altLang="zh-CN" sz="800" dirty="0"/>
+              <a:t>(</a:t>
+            </a:r>
+            <a:r>
+              <a:rPr lang="en-US" altLang="zh-CN" sz="800" dirty="0" err="1"/>
+              <a:t>cOctNode</a:t>
+            </a:r>
+            <a:r>
+              <a:rPr lang="en-US" altLang="zh-CN" sz="800" dirty="0"/>
+              <a:t> &amp;node);</a:t>
+            </a:r>
+          </a:p>
+          <a:p>
+            <a:r>
+              <a:rPr lang="en-US" altLang="zh-CN" sz="800" dirty="0"/>
+              <a:t>    </a:t>
+            </a:r>
+            <a:r>
+              <a:rPr lang="en-US" altLang="zh-CN" sz="800" dirty="0" err="1"/>
+              <a:t>octree.setup_mshPtsList</a:t>
+            </a:r>
+            <a:r>
+              <a:rPr lang="en-US" altLang="zh-CN" sz="800" dirty="0"/>
+              <a:t>();</a:t>
+            </a:r>
+          </a:p>
+          <a:p>
+            <a:r>
+              <a:rPr lang="en-US" altLang="zh-CN" sz="800" dirty="0"/>
+              <a:t>    </a:t>
+            </a:r>
+            <a:r>
+              <a:rPr lang="en-US" altLang="zh-CN" sz="800" dirty="0" err="1"/>
+              <a:t>octree.setup_mshFacesList</a:t>
+            </a:r>
+            <a:r>
+              <a:rPr lang="en-US" altLang="zh-CN" sz="800" dirty="0"/>
+              <a:t>(); //</a:t>
+            </a:r>
+            <a:r>
+              <a:rPr lang="zh-CN" altLang="en-US" sz="800" dirty="0"/>
+              <a:t>不删除</a:t>
+            </a:r>
+            <a:r>
+              <a:rPr lang="en-US" altLang="zh-CN" sz="800" dirty="0"/>
+              <a:t>node</a:t>
+            </a:r>
+            <a:r>
+              <a:rPr lang="zh-CN" altLang="en-US" sz="800" dirty="0"/>
+              <a:t>的面，只需设置面的状态为不输出。</a:t>
+            </a:r>
+            <a:endParaRPr lang="en-US" altLang="zh-CN" sz="800" dirty="0"/>
+          </a:p>
+          <a:p>
+            <a:r>
+              <a:rPr lang="en-US" altLang="zh-CN" sz="800" dirty="0"/>
+              <a:t>//</a:t>
+            </a:r>
+            <a:r>
+              <a:rPr lang="zh-CN" altLang="en-US" sz="800" dirty="0"/>
+              <a:t>遍历时，设置面是否为内部面。先判断两相邻面的大小，大的为不输出，小的为输出。</a:t>
+            </a:r>
+            <a:endParaRPr lang="en-US" altLang="zh-CN" sz="800" dirty="0"/>
+          </a:p>
+          <a:p>
+            <a:r>
+              <a:rPr lang="en-US" altLang="zh-CN" sz="800" dirty="0"/>
+              <a:t>//</a:t>
+            </a:r>
+            <a:r>
+              <a:rPr lang="zh-CN" altLang="en-US" sz="800" dirty="0"/>
+              <a:t>再判断他们所属标号大小，如果大面所属标号</a:t>
+            </a:r>
+            <a:r>
+              <a:rPr lang="en-US" altLang="zh-CN" sz="800" dirty="0"/>
+              <a:t>&gt;</a:t>
+            </a:r>
+            <a:r>
+              <a:rPr lang="zh-CN" altLang="en-US" sz="800" dirty="0"/>
+              <a:t>小面所属标号，反转小面序列，交换小面所属标号。如果大面所属标号</a:t>
+            </a:r>
+            <a:r>
+              <a:rPr lang="en-US" altLang="zh-CN" sz="800" dirty="0"/>
+              <a:t>&lt;</a:t>
+            </a:r>
+            <a:r>
+              <a:rPr lang="zh-CN" altLang="en-US" sz="800" dirty="0"/>
+              <a:t>小面所属标号，维持现状。</a:t>
+            </a:r>
+            <a:endParaRPr lang="en-US" altLang="zh-CN" sz="800" dirty="0"/>
+          </a:p>
+          <a:p>
+            <a:r>
+              <a:rPr lang="en-US" altLang="zh-CN" sz="800" dirty="0" err="1"/>
+              <a:t>octree.setup_nodePhyName</a:t>
+            </a:r>
+            <a:r>
+              <a:rPr lang="en-US" altLang="zh-CN" sz="800" dirty="0"/>
+              <a:t>();</a:t>
+            </a:r>
+          </a:p>
+          <a:p>
+            <a:r>
+              <a:rPr lang="en-US" altLang="zh-CN" sz="800" dirty="0"/>
+              <a:t>    </a:t>
+            </a:r>
+            <a:r>
+              <a:rPr lang="en-US" altLang="zh-CN" sz="800" dirty="0" err="1"/>
+              <a:t>octree.setup_mshBdsList</a:t>
+            </a:r>
+            <a:r>
+              <a:rPr lang="en-US" altLang="zh-CN" sz="800" dirty="0"/>
+              <a:t>();</a:t>
+            </a:r>
+          </a:p>
+          <a:p>
+            <a:r>
+              <a:rPr lang="en-US" altLang="zh-CN" sz="800" dirty="0"/>
+              <a:t>}</a:t>
+            </a:r>
+          </a:p>
+        </p:txBody>
+      </p:sp>
+    </p:spTree>
+    <p:extLst>
+      <p:ext uri="{BB962C8B-B14F-4D97-AF65-F5344CB8AC3E}">
+        <p14:creationId xmlns:p14="http://schemas.microsoft.com/office/powerpoint/2010/main" val="1521519341"/>
       </p:ext>
     </p:extLst>
   </p:cSld>

</xml_diff>

<commit_message>
22 Dec 2020 SHZ Office
</commit_message>
<xml_diff>
--- a/etc/Octree_Machanism.pptx
+++ b/etc/Octree_Machanism.pptx
@@ -208,7 +208,7 @@
           <a:p>
             <a:fld id="{4A9EC5E2-9960-4CE5-BBF9-CC6A3A85A6BA}" type="datetimeFigureOut">
               <a:rPr lang="zh-CN" altLang="en-US" smtClean="0"/>
-              <a:t>2020/12/21</a:t>
+              <a:t>2020/12/22</a:t>
             </a:fld>
             <a:endParaRPr lang="zh-CN" altLang="en-US"/>
           </a:p>
@@ -706,7 +706,7 @@
           <a:p>
             <a:fld id="{117B3124-7878-45FD-A888-9101914B5913}" type="datetimeFigureOut">
               <a:rPr lang="zh-CN" altLang="en-US" smtClean="0"/>
-              <a:t>2020/12/21</a:t>
+              <a:t>2020/12/22</a:t>
             </a:fld>
             <a:endParaRPr lang="zh-CN" altLang="en-US"/>
           </a:p>
@@ -904,7 +904,7 @@
           <a:p>
             <a:fld id="{117B3124-7878-45FD-A888-9101914B5913}" type="datetimeFigureOut">
               <a:rPr lang="zh-CN" altLang="en-US" smtClean="0"/>
-              <a:t>2020/12/21</a:t>
+              <a:t>2020/12/22</a:t>
             </a:fld>
             <a:endParaRPr lang="zh-CN" altLang="en-US"/>
           </a:p>
@@ -1112,7 +1112,7 @@
           <a:p>
             <a:fld id="{117B3124-7878-45FD-A888-9101914B5913}" type="datetimeFigureOut">
               <a:rPr lang="zh-CN" altLang="en-US" smtClean="0"/>
-              <a:t>2020/12/21</a:t>
+              <a:t>2020/12/22</a:t>
             </a:fld>
             <a:endParaRPr lang="zh-CN" altLang="en-US"/>
           </a:p>
@@ -1310,7 +1310,7 @@
           <a:p>
             <a:fld id="{117B3124-7878-45FD-A888-9101914B5913}" type="datetimeFigureOut">
               <a:rPr lang="zh-CN" altLang="en-US" smtClean="0"/>
-              <a:t>2020/12/21</a:t>
+              <a:t>2020/12/22</a:t>
             </a:fld>
             <a:endParaRPr lang="zh-CN" altLang="en-US"/>
           </a:p>
@@ -1585,7 +1585,7 @@
           <a:p>
             <a:fld id="{117B3124-7878-45FD-A888-9101914B5913}" type="datetimeFigureOut">
               <a:rPr lang="zh-CN" altLang="en-US" smtClean="0"/>
-              <a:t>2020/12/21</a:t>
+              <a:t>2020/12/22</a:t>
             </a:fld>
             <a:endParaRPr lang="zh-CN" altLang="en-US"/>
           </a:p>
@@ -1850,7 +1850,7 @@
           <a:p>
             <a:fld id="{117B3124-7878-45FD-A888-9101914B5913}" type="datetimeFigureOut">
               <a:rPr lang="zh-CN" altLang="en-US" smtClean="0"/>
-              <a:t>2020/12/21</a:t>
+              <a:t>2020/12/22</a:t>
             </a:fld>
             <a:endParaRPr lang="zh-CN" altLang="en-US"/>
           </a:p>
@@ -2262,7 +2262,7 @@
           <a:p>
             <a:fld id="{117B3124-7878-45FD-A888-9101914B5913}" type="datetimeFigureOut">
               <a:rPr lang="zh-CN" altLang="en-US" smtClean="0"/>
-              <a:t>2020/12/21</a:t>
+              <a:t>2020/12/22</a:t>
             </a:fld>
             <a:endParaRPr lang="zh-CN" altLang="en-US"/>
           </a:p>
@@ -2403,7 +2403,7 @@
           <a:p>
             <a:fld id="{117B3124-7878-45FD-A888-9101914B5913}" type="datetimeFigureOut">
               <a:rPr lang="zh-CN" altLang="en-US" smtClean="0"/>
-              <a:t>2020/12/21</a:t>
+              <a:t>2020/12/22</a:t>
             </a:fld>
             <a:endParaRPr lang="zh-CN" altLang="en-US"/>
           </a:p>
@@ -2516,7 +2516,7 @@
           <a:p>
             <a:fld id="{117B3124-7878-45FD-A888-9101914B5913}" type="datetimeFigureOut">
               <a:rPr lang="zh-CN" altLang="en-US" smtClean="0"/>
-              <a:t>2020/12/21</a:t>
+              <a:t>2020/12/22</a:t>
             </a:fld>
             <a:endParaRPr lang="zh-CN" altLang="en-US"/>
           </a:p>
@@ -2827,7 +2827,7 @@
           <a:p>
             <a:fld id="{117B3124-7878-45FD-A888-9101914B5913}" type="datetimeFigureOut">
               <a:rPr lang="zh-CN" altLang="en-US" smtClean="0"/>
-              <a:t>2020/12/21</a:t>
+              <a:t>2020/12/22</a:t>
             </a:fld>
             <a:endParaRPr lang="zh-CN" altLang="en-US"/>
           </a:p>
@@ -3115,7 +3115,7 @@
           <a:p>
             <a:fld id="{117B3124-7878-45FD-A888-9101914B5913}" type="datetimeFigureOut">
               <a:rPr lang="zh-CN" altLang="en-US" smtClean="0"/>
-              <a:t>2020/12/21</a:t>
+              <a:t>2020/12/22</a:t>
             </a:fld>
             <a:endParaRPr lang="zh-CN" altLang="en-US"/>
           </a:p>
@@ -3356,7 +3356,7 @@
           <a:p>
             <a:fld id="{117B3124-7878-45FD-A888-9101914B5913}" type="datetimeFigureOut">
               <a:rPr lang="zh-CN" altLang="en-US" smtClean="0"/>
-              <a:t>2020/12/21</a:t>
+              <a:t>2020/12/22</a:t>
             </a:fld>
             <a:endParaRPr lang="zh-CN" altLang="en-US"/>
           </a:p>
@@ -5931,7 +5931,7 @@
             </a:r>
             <a:r>
               <a:rPr lang="en-US" altLang="zh-CN" sz="800" dirty="0" err="1"/>
-              <a:t>cTri</a:t>
+              <a:t>cFeatureFace</a:t>
             </a:r>
             <a:r>
               <a:rPr lang="en-US" altLang="zh-CN" sz="800" dirty="0"/>

</xml_diff>

<commit_message>
16 Feb 2021 Home Office
</commit_message>
<xml_diff>
--- a/etc/Octree_Machanism.pptx
+++ b/etc/Octree_Machanism.pptx
@@ -208,7 +208,7 @@
           <a:p>
             <a:fld id="{4A9EC5E2-9960-4CE5-BBF9-CC6A3A85A6BA}" type="datetimeFigureOut">
               <a:rPr lang="zh-CN" altLang="en-US" smtClean="0"/>
-              <a:t>2021/2/9</a:t>
+              <a:t>2021/2/15</a:t>
             </a:fld>
             <a:endParaRPr lang="zh-CN" altLang="en-US"/>
           </a:p>
@@ -706,7 +706,7 @@
           <a:p>
             <a:fld id="{117B3124-7878-45FD-A888-9101914B5913}" type="datetimeFigureOut">
               <a:rPr lang="zh-CN" altLang="en-US" smtClean="0"/>
-              <a:t>2021/2/9</a:t>
+              <a:t>2021/2/15</a:t>
             </a:fld>
             <a:endParaRPr lang="zh-CN" altLang="en-US"/>
           </a:p>
@@ -904,7 +904,7 @@
           <a:p>
             <a:fld id="{117B3124-7878-45FD-A888-9101914B5913}" type="datetimeFigureOut">
               <a:rPr lang="zh-CN" altLang="en-US" smtClean="0"/>
-              <a:t>2021/2/9</a:t>
+              <a:t>2021/2/15</a:t>
             </a:fld>
             <a:endParaRPr lang="zh-CN" altLang="en-US"/>
           </a:p>
@@ -1112,7 +1112,7 @@
           <a:p>
             <a:fld id="{117B3124-7878-45FD-A888-9101914B5913}" type="datetimeFigureOut">
               <a:rPr lang="zh-CN" altLang="en-US" smtClean="0"/>
-              <a:t>2021/2/9</a:t>
+              <a:t>2021/2/15</a:t>
             </a:fld>
             <a:endParaRPr lang="zh-CN" altLang="en-US"/>
           </a:p>
@@ -1310,7 +1310,7 @@
           <a:p>
             <a:fld id="{117B3124-7878-45FD-A888-9101914B5913}" type="datetimeFigureOut">
               <a:rPr lang="zh-CN" altLang="en-US" smtClean="0"/>
-              <a:t>2021/2/9</a:t>
+              <a:t>2021/2/15</a:t>
             </a:fld>
             <a:endParaRPr lang="zh-CN" altLang="en-US"/>
           </a:p>
@@ -1585,7 +1585,7 @@
           <a:p>
             <a:fld id="{117B3124-7878-45FD-A888-9101914B5913}" type="datetimeFigureOut">
               <a:rPr lang="zh-CN" altLang="en-US" smtClean="0"/>
-              <a:t>2021/2/9</a:t>
+              <a:t>2021/2/15</a:t>
             </a:fld>
             <a:endParaRPr lang="zh-CN" altLang="en-US"/>
           </a:p>
@@ -1850,7 +1850,7 @@
           <a:p>
             <a:fld id="{117B3124-7878-45FD-A888-9101914B5913}" type="datetimeFigureOut">
               <a:rPr lang="zh-CN" altLang="en-US" smtClean="0"/>
-              <a:t>2021/2/9</a:t>
+              <a:t>2021/2/15</a:t>
             </a:fld>
             <a:endParaRPr lang="zh-CN" altLang="en-US"/>
           </a:p>
@@ -2262,7 +2262,7 @@
           <a:p>
             <a:fld id="{117B3124-7878-45FD-A888-9101914B5913}" type="datetimeFigureOut">
               <a:rPr lang="zh-CN" altLang="en-US" smtClean="0"/>
-              <a:t>2021/2/9</a:t>
+              <a:t>2021/2/15</a:t>
             </a:fld>
             <a:endParaRPr lang="zh-CN" altLang="en-US"/>
           </a:p>
@@ -2403,7 +2403,7 @@
           <a:p>
             <a:fld id="{117B3124-7878-45FD-A888-9101914B5913}" type="datetimeFigureOut">
               <a:rPr lang="zh-CN" altLang="en-US" smtClean="0"/>
-              <a:t>2021/2/9</a:t>
+              <a:t>2021/2/15</a:t>
             </a:fld>
             <a:endParaRPr lang="zh-CN" altLang="en-US"/>
           </a:p>
@@ -2516,7 +2516,7 @@
           <a:p>
             <a:fld id="{117B3124-7878-45FD-A888-9101914B5913}" type="datetimeFigureOut">
               <a:rPr lang="zh-CN" altLang="en-US" smtClean="0"/>
-              <a:t>2021/2/9</a:t>
+              <a:t>2021/2/15</a:t>
             </a:fld>
             <a:endParaRPr lang="zh-CN" altLang="en-US"/>
           </a:p>
@@ -2827,7 +2827,7 @@
           <a:p>
             <a:fld id="{117B3124-7878-45FD-A888-9101914B5913}" type="datetimeFigureOut">
               <a:rPr lang="zh-CN" altLang="en-US" smtClean="0"/>
-              <a:t>2021/2/9</a:t>
+              <a:t>2021/2/15</a:t>
             </a:fld>
             <a:endParaRPr lang="zh-CN" altLang="en-US"/>
           </a:p>
@@ -3115,7 +3115,7 @@
           <a:p>
             <a:fld id="{117B3124-7878-45FD-A888-9101914B5913}" type="datetimeFigureOut">
               <a:rPr lang="zh-CN" altLang="en-US" smtClean="0"/>
-              <a:t>2021/2/9</a:t>
+              <a:t>2021/2/15</a:t>
             </a:fld>
             <a:endParaRPr lang="zh-CN" altLang="en-US"/>
           </a:p>
@@ -3356,7 +3356,7 @@
           <a:p>
             <a:fld id="{117B3124-7878-45FD-A888-9101914B5913}" type="datetimeFigureOut">
               <a:rPr lang="zh-CN" altLang="en-US" smtClean="0"/>
-              <a:t>2021/2/9</a:t>
+              <a:t>2021/2/15</a:t>
             </a:fld>
             <a:endParaRPr lang="zh-CN" altLang="en-US"/>
           </a:p>
@@ -3903,12 +3903,216 @@
           </a:prstGeom>
         </p:spPr>
       </p:pic>
+      <p:sp>
+        <p:nvSpPr>
+          <p:cNvPr id="5" name="矩形 43">
+            <a:extLst>
+              <a:ext uri="{FF2B5EF4-FFF2-40B4-BE49-F238E27FC236}">
+                <a16:creationId xmlns:a16="http://schemas.microsoft.com/office/drawing/2014/main" id="{DBBE8DA6-A7F3-4B8E-BDBB-9EB973C86F89}"/>
+              </a:ext>
+            </a:extLst>
+          </p:cNvPr>
+          <p:cNvSpPr/>
+          <p:nvPr/>
+        </p:nvSpPr>
+        <p:spPr>
+          <a:xfrm>
+            <a:off x="1608241" y="5058304"/>
+            <a:ext cx="279244" cy="369332"/>
+          </a:xfrm>
+          <a:prstGeom prst="rect">
+            <a:avLst/>
+          </a:prstGeom>
+        </p:spPr>
+        <p:txBody>
+          <a:bodyPr wrap="none">
+            <a:spAutoFit/>
+          </a:bodyPr>
+          <a:lstStyle/>
+          <a:p>
+            <a:r>
+              <a:rPr lang="en-US" altLang="zh-CN" dirty="0"/>
+              <a:t>s</a:t>
+            </a:r>
+          </a:p>
+        </p:txBody>
+      </p:sp>
+      <p:sp>
+        <p:nvSpPr>
+          <p:cNvPr id="7" name="矩形 43">
+            <a:extLst>
+              <a:ext uri="{FF2B5EF4-FFF2-40B4-BE49-F238E27FC236}">
+                <a16:creationId xmlns:a16="http://schemas.microsoft.com/office/drawing/2014/main" id="{80F02EB3-A2DC-4BA9-A6A5-A716CBCF62CD}"/>
+              </a:ext>
+            </a:extLst>
+          </p:cNvPr>
+          <p:cNvSpPr/>
+          <p:nvPr/>
+        </p:nvSpPr>
+        <p:spPr>
+          <a:xfrm>
+            <a:off x="2479588" y="4954641"/>
+            <a:ext cx="303288" cy="369332"/>
+          </a:xfrm>
+          <a:prstGeom prst="rect">
+            <a:avLst/>
+          </a:prstGeom>
+        </p:spPr>
+        <p:txBody>
+          <a:bodyPr wrap="none">
+            <a:spAutoFit/>
+          </a:bodyPr>
+          <a:lstStyle/>
+          <a:p>
+            <a:r>
+              <a:rPr lang="en-US" altLang="zh-CN" dirty="0"/>
+              <a:t>e</a:t>
+            </a:r>
+          </a:p>
+        </p:txBody>
+      </p:sp>
+      <p:sp>
+        <p:nvSpPr>
+          <p:cNvPr id="8" name="矩形 43">
+            <a:extLst>
+              <a:ext uri="{FF2B5EF4-FFF2-40B4-BE49-F238E27FC236}">
+                <a16:creationId xmlns:a16="http://schemas.microsoft.com/office/drawing/2014/main" id="{41EAA324-7D1B-4D0E-9700-44F01EE7E325}"/>
+              </a:ext>
+            </a:extLst>
+          </p:cNvPr>
+          <p:cNvSpPr/>
+          <p:nvPr/>
+        </p:nvSpPr>
+        <p:spPr>
+          <a:xfrm>
+            <a:off x="2509624" y="4484839"/>
+            <a:ext cx="311304" cy="369332"/>
+          </a:xfrm>
+          <a:prstGeom prst="rect">
+            <a:avLst/>
+          </a:prstGeom>
+        </p:spPr>
+        <p:txBody>
+          <a:bodyPr wrap="none">
+            <a:spAutoFit/>
+          </a:bodyPr>
+          <a:lstStyle/>
+          <a:p>
+            <a:r>
+              <a:rPr lang="en-US" altLang="zh-CN" dirty="0"/>
+              <a:t>n</a:t>
+            </a:r>
+          </a:p>
+        </p:txBody>
+      </p:sp>
+      <p:sp>
+        <p:nvSpPr>
+          <p:cNvPr id="9" name="矩形 43">
+            <a:extLst>
+              <a:ext uri="{FF2B5EF4-FFF2-40B4-BE49-F238E27FC236}">
+                <a16:creationId xmlns:a16="http://schemas.microsoft.com/office/drawing/2014/main" id="{C93B2FE2-AA84-464B-9FBE-C8DA0A420279}"/>
+              </a:ext>
+            </a:extLst>
+          </p:cNvPr>
+          <p:cNvSpPr/>
+          <p:nvPr/>
+        </p:nvSpPr>
+        <p:spPr>
+          <a:xfrm>
+            <a:off x="1950362" y="4070959"/>
+            <a:ext cx="258404" cy="369332"/>
+          </a:xfrm>
+          <a:prstGeom prst="rect">
+            <a:avLst/>
+          </a:prstGeom>
+        </p:spPr>
+        <p:txBody>
+          <a:bodyPr wrap="none">
+            <a:spAutoFit/>
+          </a:bodyPr>
+          <a:lstStyle/>
+          <a:p>
+            <a:r>
+              <a:rPr lang="en-US" altLang="zh-CN" dirty="0"/>
+              <a:t>t</a:t>
+            </a:r>
+          </a:p>
+        </p:txBody>
+      </p:sp>
+      <p:sp>
+        <p:nvSpPr>
+          <p:cNvPr id="11" name="矩形 43">
+            <a:extLst>
+              <a:ext uri="{FF2B5EF4-FFF2-40B4-BE49-F238E27FC236}">
+                <a16:creationId xmlns:a16="http://schemas.microsoft.com/office/drawing/2014/main" id="{4F0FFAF5-1032-40FA-B9D5-42E6A0F672A0}"/>
+              </a:ext>
+            </a:extLst>
+          </p:cNvPr>
+          <p:cNvSpPr/>
+          <p:nvPr/>
+        </p:nvSpPr>
+        <p:spPr>
+          <a:xfrm>
+            <a:off x="1282123" y="4688972"/>
+            <a:ext cx="346570" cy="369332"/>
+          </a:xfrm>
+          <a:prstGeom prst="rect">
+            <a:avLst/>
+          </a:prstGeom>
+        </p:spPr>
+        <p:txBody>
+          <a:bodyPr wrap="none">
+            <a:spAutoFit/>
+          </a:bodyPr>
+          <a:lstStyle/>
+          <a:p>
+            <a:r>
+              <a:rPr lang="en-US" altLang="zh-CN" dirty="0"/>
+              <a:t>w</a:t>
+            </a:r>
+          </a:p>
+        </p:txBody>
+      </p:sp>
+      <p:sp>
+        <p:nvSpPr>
+          <p:cNvPr id="12" name="矩形 43">
+            <a:extLst>
+              <a:ext uri="{FF2B5EF4-FFF2-40B4-BE49-F238E27FC236}">
+                <a16:creationId xmlns:a16="http://schemas.microsoft.com/office/drawing/2014/main" id="{C69C03C2-83D3-4221-95BD-CF883CBE7F52}"/>
+              </a:ext>
+            </a:extLst>
+          </p:cNvPr>
+          <p:cNvSpPr/>
+          <p:nvPr/>
+        </p:nvSpPr>
+        <p:spPr>
+          <a:xfrm>
+            <a:off x="1997819" y="5578399"/>
+            <a:ext cx="317716" cy="369332"/>
+          </a:xfrm>
+          <a:prstGeom prst="rect">
+            <a:avLst/>
+          </a:prstGeom>
+        </p:spPr>
+        <p:txBody>
+          <a:bodyPr wrap="none">
+            <a:spAutoFit/>
+          </a:bodyPr>
+          <a:lstStyle/>
+          <a:p>
+            <a:r>
+              <a:rPr lang="en-US" altLang="zh-CN" dirty="0"/>
+              <a:t>b</a:t>
+            </a:r>
+          </a:p>
+        </p:txBody>
+      </p:sp>
       <p:pic>
         <p:nvPicPr>
-          <p:cNvPr id="10" name="Picture 9">
+          <p:cNvPr id="14" name="Picture 13">
             <a:extLst>
               <a:ext uri="{FF2B5EF4-FFF2-40B4-BE49-F238E27FC236}">
-                <a16:creationId xmlns:a16="http://schemas.microsoft.com/office/drawing/2014/main" id="{6D864569-FBB4-47E3-81F6-39711972DFEC}"/>
+                <a16:creationId xmlns:a16="http://schemas.microsoft.com/office/drawing/2014/main" id="{17E266B2-A12F-439F-B403-CCBCEE3E6F3F}"/>
               </a:ext>
             </a:extLst>
           </p:cNvPr>
@@ -3925,14 +4129,671 @@
         </p:blipFill>
         <p:spPr>
           <a:xfrm>
-            <a:off x="3847667" y="3925792"/>
-            <a:ext cx="3190442" cy="2366581"/>
+            <a:off x="8310328" y="2358413"/>
+            <a:ext cx="2408665" cy="2109966"/>
           </a:xfrm>
           <a:prstGeom prst="rect">
             <a:avLst/>
           </a:prstGeom>
         </p:spPr>
       </p:pic>
+      <p:pic>
+        <p:nvPicPr>
+          <p:cNvPr id="18" name="Picture 17">
+            <a:extLst>
+              <a:ext uri="{FF2B5EF4-FFF2-40B4-BE49-F238E27FC236}">
+                <a16:creationId xmlns:a16="http://schemas.microsoft.com/office/drawing/2014/main" id="{BE966116-1E68-4C75-8EBF-39ACF2F281CC}"/>
+              </a:ext>
+            </a:extLst>
+          </p:cNvPr>
+          <p:cNvPicPr>
+            <a:picLocks noChangeAspect="1"/>
+          </p:cNvPicPr>
+          <p:nvPr/>
+        </p:nvPicPr>
+        <p:blipFill>
+          <a:blip r:embed="rId4"/>
+          <a:stretch>
+            <a:fillRect/>
+          </a:stretch>
+        </p:blipFill>
+        <p:spPr>
+          <a:xfrm>
+            <a:off x="8230270" y="4602368"/>
+            <a:ext cx="2688552" cy="2321393"/>
+          </a:xfrm>
+          <a:prstGeom prst="rect">
+            <a:avLst/>
+          </a:prstGeom>
+        </p:spPr>
+      </p:pic>
+      <p:pic>
+        <p:nvPicPr>
+          <p:cNvPr id="20" name="Picture 19">
+            <a:extLst>
+              <a:ext uri="{FF2B5EF4-FFF2-40B4-BE49-F238E27FC236}">
+                <a16:creationId xmlns:a16="http://schemas.microsoft.com/office/drawing/2014/main" id="{3FFDC63B-FD77-49D0-8F10-4B10D1DCB48F}"/>
+              </a:ext>
+            </a:extLst>
+          </p:cNvPr>
+          <p:cNvPicPr>
+            <a:picLocks noChangeAspect="1"/>
+          </p:cNvPicPr>
+          <p:nvPr/>
+        </p:nvPicPr>
+        <p:blipFill>
+          <a:blip r:embed="rId5"/>
+          <a:stretch>
+            <a:fillRect/>
+          </a:stretch>
+        </p:blipFill>
+        <p:spPr>
+          <a:xfrm>
+            <a:off x="3926940" y="3064959"/>
+            <a:ext cx="3457575" cy="3248025"/>
+          </a:xfrm>
+          <a:prstGeom prst="rect">
+            <a:avLst/>
+          </a:prstGeom>
+        </p:spPr>
+      </p:pic>
+      <p:grpSp>
+        <p:nvGrpSpPr>
+          <p:cNvPr id="31" name="Group 30">
+            <a:extLst>
+              <a:ext uri="{FF2B5EF4-FFF2-40B4-BE49-F238E27FC236}">
+                <a16:creationId xmlns:a16="http://schemas.microsoft.com/office/drawing/2014/main" id="{1718C090-FC3B-41AE-B106-71F85F35707F}"/>
+              </a:ext>
+            </a:extLst>
+          </p:cNvPr>
+          <p:cNvGrpSpPr/>
+          <p:nvPr/>
+        </p:nvGrpSpPr>
+        <p:grpSpPr>
+          <a:xfrm>
+            <a:off x="8181164" y="181128"/>
+            <a:ext cx="2666995" cy="2150185"/>
+            <a:chOff x="7384515" y="3092785"/>
+            <a:chExt cx="2666995" cy="2150185"/>
+          </a:xfrm>
+        </p:grpSpPr>
+        <p:pic>
+          <p:nvPicPr>
+            <p:cNvPr id="16" name="Picture 15">
+              <a:extLst>
+                <a:ext uri="{FF2B5EF4-FFF2-40B4-BE49-F238E27FC236}">
+                  <a16:creationId xmlns:a16="http://schemas.microsoft.com/office/drawing/2014/main" id="{C44E46F1-526D-4F60-AB4D-21DCA24ACBF2}"/>
+                </a:ext>
+              </a:extLst>
+            </p:cNvPr>
+            <p:cNvPicPr>
+              <a:picLocks noChangeAspect="1"/>
+            </p:cNvPicPr>
+            <p:nvPr/>
+          </p:nvPicPr>
+          <p:blipFill>
+            <a:blip r:embed="rId6"/>
+            <a:stretch>
+              <a:fillRect/>
+            </a:stretch>
+          </p:blipFill>
+          <p:spPr>
+            <a:xfrm>
+              <a:off x="7384515" y="3092785"/>
+              <a:ext cx="2666995" cy="2150185"/>
+            </a:xfrm>
+            <a:prstGeom prst="rect">
+              <a:avLst/>
+            </a:prstGeom>
+          </p:spPr>
+        </p:pic>
+        <p:sp>
+          <p:nvSpPr>
+            <p:cNvPr id="23" name="矩形 43">
+              <a:extLst>
+                <a:ext uri="{FF2B5EF4-FFF2-40B4-BE49-F238E27FC236}">
+                  <a16:creationId xmlns:a16="http://schemas.microsoft.com/office/drawing/2014/main" id="{ECA22ED0-D37C-422A-AE9B-1CC83140FD76}"/>
+                </a:ext>
+              </a:extLst>
+            </p:cNvPr>
+            <p:cNvSpPr/>
+            <p:nvPr/>
+          </p:nvSpPr>
+          <p:spPr>
+            <a:xfrm>
+              <a:off x="8191799" y="4075026"/>
+              <a:ext cx="279244" cy="369332"/>
+            </a:xfrm>
+            <a:prstGeom prst="rect">
+              <a:avLst/>
+            </a:prstGeom>
+          </p:spPr>
+          <p:txBody>
+            <a:bodyPr wrap="none">
+              <a:spAutoFit/>
+            </a:bodyPr>
+            <a:lstStyle/>
+            <a:p>
+              <a:r>
+                <a:rPr lang="en-US" altLang="zh-CN" dirty="0"/>
+                <a:t>s</a:t>
+              </a:r>
+            </a:p>
+          </p:txBody>
+        </p:sp>
+        <p:sp>
+          <p:nvSpPr>
+            <p:cNvPr id="24" name="矩形 43">
+              <a:extLst>
+                <a:ext uri="{FF2B5EF4-FFF2-40B4-BE49-F238E27FC236}">
+                  <a16:creationId xmlns:a16="http://schemas.microsoft.com/office/drawing/2014/main" id="{C7E3B6EE-4C16-46E0-8B69-AFA38951226D}"/>
+                </a:ext>
+              </a:extLst>
+            </p:cNvPr>
+            <p:cNvSpPr/>
+            <p:nvPr/>
+          </p:nvSpPr>
+          <p:spPr>
+            <a:xfrm>
+              <a:off x="9050228" y="3429000"/>
+              <a:ext cx="311304" cy="369332"/>
+            </a:xfrm>
+            <a:prstGeom prst="rect">
+              <a:avLst/>
+            </a:prstGeom>
+          </p:spPr>
+          <p:txBody>
+            <a:bodyPr wrap="none">
+              <a:spAutoFit/>
+            </a:bodyPr>
+            <a:lstStyle/>
+            <a:p>
+              <a:r>
+                <a:rPr lang="en-US" altLang="zh-CN" dirty="0"/>
+                <a:t>n</a:t>
+              </a:r>
+            </a:p>
+          </p:txBody>
+        </p:sp>
+        <p:sp>
+          <p:nvSpPr>
+            <p:cNvPr id="25" name="矩形 43">
+              <a:extLst>
+                <a:ext uri="{FF2B5EF4-FFF2-40B4-BE49-F238E27FC236}">
+                  <a16:creationId xmlns:a16="http://schemas.microsoft.com/office/drawing/2014/main" id="{5736F6AB-0BD0-457A-9930-57EA5068FCEF}"/>
+                </a:ext>
+              </a:extLst>
+            </p:cNvPr>
+            <p:cNvSpPr/>
+            <p:nvPr/>
+          </p:nvSpPr>
+          <p:spPr>
+            <a:xfrm>
+              <a:off x="8110618" y="3457990"/>
+              <a:ext cx="346570" cy="369332"/>
+            </a:xfrm>
+            <a:prstGeom prst="rect">
+              <a:avLst/>
+            </a:prstGeom>
+          </p:spPr>
+          <p:txBody>
+            <a:bodyPr wrap="none">
+              <a:spAutoFit/>
+            </a:bodyPr>
+            <a:lstStyle/>
+            <a:p>
+              <a:r>
+                <a:rPr lang="en-US" altLang="zh-CN" dirty="0"/>
+                <a:t>w</a:t>
+              </a:r>
+            </a:p>
+          </p:txBody>
+        </p:sp>
+        <p:sp>
+          <p:nvSpPr>
+            <p:cNvPr id="26" name="矩形 43">
+              <a:extLst>
+                <a:ext uri="{FF2B5EF4-FFF2-40B4-BE49-F238E27FC236}">
+                  <a16:creationId xmlns:a16="http://schemas.microsoft.com/office/drawing/2014/main" id="{CABDAED4-4807-4182-9818-1A62F32201A4}"/>
+                </a:ext>
+              </a:extLst>
+            </p:cNvPr>
+            <p:cNvSpPr/>
+            <p:nvPr/>
+          </p:nvSpPr>
+          <p:spPr>
+            <a:xfrm>
+              <a:off x="9034897" y="4024109"/>
+              <a:ext cx="303288" cy="369332"/>
+            </a:xfrm>
+            <a:prstGeom prst="rect">
+              <a:avLst/>
+            </a:prstGeom>
+          </p:spPr>
+          <p:txBody>
+            <a:bodyPr wrap="none">
+              <a:spAutoFit/>
+            </a:bodyPr>
+            <a:lstStyle/>
+            <a:p>
+              <a:r>
+                <a:rPr lang="en-US" altLang="zh-CN" dirty="0"/>
+                <a:t>e</a:t>
+              </a:r>
+            </a:p>
+          </p:txBody>
+        </p:sp>
+        <p:sp>
+          <p:nvSpPr>
+            <p:cNvPr id="27" name="矩形 43">
+              <a:extLst>
+                <a:ext uri="{FF2B5EF4-FFF2-40B4-BE49-F238E27FC236}">
+                  <a16:creationId xmlns:a16="http://schemas.microsoft.com/office/drawing/2014/main" id="{383CCC64-0CCC-417C-8FFB-D96A381190B9}"/>
+                </a:ext>
+              </a:extLst>
+            </p:cNvPr>
+            <p:cNvSpPr/>
+            <p:nvPr/>
+          </p:nvSpPr>
+          <p:spPr>
+            <a:xfrm>
+              <a:off x="8578964" y="4172003"/>
+              <a:ext cx="397866" cy="369332"/>
+            </a:xfrm>
+            <a:prstGeom prst="rect">
+              <a:avLst/>
+            </a:prstGeom>
+          </p:spPr>
+          <p:txBody>
+            <a:bodyPr wrap="none">
+              <a:spAutoFit/>
+            </a:bodyPr>
+            <a:lstStyle/>
+            <a:p>
+              <a:r>
+                <a:rPr lang="en-US" altLang="zh-CN" dirty="0"/>
+                <a:t>se</a:t>
+              </a:r>
+            </a:p>
+          </p:txBody>
+        </p:sp>
+        <p:sp>
+          <p:nvSpPr>
+            <p:cNvPr id="28" name="矩形 43">
+              <a:extLst>
+                <a:ext uri="{FF2B5EF4-FFF2-40B4-BE49-F238E27FC236}">
+                  <a16:creationId xmlns:a16="http://schemas.microsoft.com/office/drawing/2014/main" id="{F382B714-477E-45B1-9990-B91C8BAD8610}"/>
+                </a:ext>
+              </a:extLst>
+            </p:cNvPr>
+            <p:cNvSpPr/>
+            <p:nvPr/>
+          </p:nvSpPr>
+          <p:spPr>
+            <a:xfrm>
+              <a:off x="9478210" y="3797653"/>
+              <a:ext cx="429926" cy="369332"/>
+            </a:xfrm>
+            <a:prstGeom prst="rect">
+              <a:avLst/>
+            </a:prstGeom>
+          </p:spPr>
+          <p:txBody>
+            <a:bodyPr wrap="none">
+              <a:spAutoFit/>
+            </a:bodyPr>
+            <a:lstStyle/>
+            <a:p>
+              <a:r>
+                <a:rPr lang="en-US" altLang="zh-CN" dirty="0"/>
+                <a:t>ne</a:t>
+              </a:r>
+            </a:p>
+          </p:txBody>
+        </p:sp>
+        <p:sp>
+          <p:nvSpPr>
+            <p:cNvPr id="29" name="矩形 43">
+              <a:extLst>
+                <a:ext uri="{FF2B5EF4-FFF2-40B4-BE49-F238E27FC236}">
+                  <a16:creationId xmlns:a16="http://schemas.microsoft.com/office/drawing/2014/main" id="{F84C1789-465A-4D52-BBDE-C27ED4BF4429}"/>
+                </a:ext>
+              </a:extLst>
+            </p:cNvPr>
+            <p:cNvSpPr/>
+            <p:nvPr/>
+          </p:nvSpPr>
+          <p:spPr>
+            <a:xfrm>
+              <a:off x="8503624" y="3341244"/>
+              <a:ext cx="473206" cy="369332"/>
+            </a:xfrm>
+            <a:prstGeom prst="rect">
+              <a:avLst/>
+            </a:prstGeom>
+          </p:spPr>
+          <p:txBody>
+            <a:bodyPr wrap="none">
+              <a:spAutoFit/>
+            </a:bodyPr>
+            <a:lstStyle/>
+            <a:p>
+              <a:r>
+                <a:rPr lang="en-US" altLang="zh-CN" dirty="0" err="1"/>
+                <a:t>nw</a:t>
+              </a:r>
+              <a:endParaRPr lang="en-US" altLang="zh-CN" dirty="0"/>
+            </a:p>
+          </p:txBody>
+        </p:sp>
+        <p:sp>
+          <p:nvSpPr>
+            <p:cNvPr id="30" name="矩形 43">
+              <a:extLst>
+                <a:ext uri="{FF2B5EF4-FFF2-40B4-BE49-F238E27FC236}">
+                  <a16:creationId xmlns:a16="http://schemas.microsoft.com/office/drawing/2014/main" id="{D138B77F-1F96-4550-910C-EC3B14820D20}"/>
+                </a:ext>
+              </a:extLst>
+            </p:cNvPr>
+            <p:cNvSpPr/>
+            <p:nvPr/>
+          </p:nvSpPr>
+          <p:spPr>
+            <a:xfrm>
+              <a:off x="7556363" y="3911937"/>
+              <a:ext cx="441146" cy="369332"/>
+            </a:xfrm>
+            <a:prstGeom prst="rect">
+              <a:avLst/>
+            </a:prstGeom>
+          </p:spPr>
+          <p:txBody>
+            <a:bodyPr wrap="none">
+              <a:spAutoFit/>
+            </a:bodyPr>
+            <a:lstStyle/>
+            <a:p>
+              <a:r>
+                <a:rPr lang="en-US" altLang="zh-CN" dirty="0" err="1"/>
+                <a:t>sw</a:t>
+              </a:r>
+              <a:endParaRPr lang="en-US" altLang="zh-CN" dirty="0"/>
+            </a:p>
+          </p:txBody>
+        </p:sp>
+      </p:grpSp>
+      <p:sp>
+        <p:nvSpPr>
+          <p:cNvPr id="32" name="矩形 43">
+            <a:extLst>
+              <a:ext uri="{FF2B5EF4-FFF2-40B4-BE49-F238E27FC236}">
+                <a16:creationId xmlns:a16="http://schemas.microsoft.com/office/drawing/2014/main" id="{4569BEEC-9533-4075-A9F7-A555912434CD}"/>
+              </a:ext>
+            </a:extLst>
+          </p:cNvPr>
+          <p:cNvSpPr/>
+          <p:nvPr/>
+        </p:nvSpPr>
+        <p:spPr>
+          <a:xfrm>
+            <a:off x="9197416" y="3337461"/>
+            <a:ext cx="279244" cy="369332"/>
+          </a:xfrm>
+          <a:prstGeom prst="rect">
+            <a:avLst/>
+          </a:prstGeom>
+        </p:spPr>
+        <p:txBody>
+          <a:bodyPr wrap="none">
+            <a:spAutoFit/>
+          </a:bodyPr>
+          <a:lstStyle/>
+          <a:p>
+            <a:r>
+              <a:rPr lang="en-US" altLang="zh-CN" dirty="0"/>
+              <a:t>s</a:t>
+            </a:r>
+          </a:p>
+        </p:txBody>
+      </p:sp>
+      <p:sp>
+        <p:nvSpPr>
+          <p:cNvPr id="33" name="矩形 43">
+            <a:extLst>
+              <a:ext uri="{FF2B5EF4-FFF2-40B4-BE49-F238E27FC236}">
+                <a16:creationId xmlns:a16="http://schemas.microsoft.com/office/drawing/2014/main" id="{F3934717-3192-44FB-AF89-D67753EAF8D0}"/>
+              </a:ext>
+            </a:extLst>
+          </p:cNvPr>
+          <p:cNvSpPr/>
+          <p:nvPr/>
+        </p:nvSpPr>
+        <p:spPr>
+          <a:xfrm>
+            <a:off x="9735064" y="3097508"/>
+            <a:ext cx="311304" cy="369332"/>
+          </a:xfrm>
+          <a:prstGeom prst="rect">
+            <a:avLst/>
+          </a:prstGeom>
+        </p:spPr>
+        <p:txBody>
+          <a:bodyPr wrap="none">
+            <a:spAutoFit/>
+          </a:bodyPr>
+          <a:lstStyle/>
+          <a:p>
+            <a:r>
+              <a:rPr lang="en-US" altLang="zh-CN" dirty="0"/>
+              <a:t>n</a:t>
+            </a:r>
+          </a:p>
+        </p:txBody>
+      </p:sp>
+      <p:sp>
+        <p:nvSpPr>
+          <p:cNvPr id="34" name="矩形 43">
+            <a:extLst>
+              <a:ext uri="{FF2B5EF4-FFF2-40B4-BE49-F238E27FC236}">
+                <a16:creationId xmlns:a16="http://schemas.microsoft.com/office/drawing/2014/main" id="{2607A73D-D5EE-4800-ACE0-373B98DE6B5C}"/>
+              </a:ext>
+            </a:extLst>
+          </p:cNvPr>
+          <p:cNvSpPr/>
+          <p:nvPr/>
+        </p:nvSpPr>
+        <p:spPr>
+          <a:xfrm>
+            <a:off x="9476660" y="2845848"/>
+            <a:ext cx="258404" cy="369332"/>
+          </a:xfrm>
+          <a:prstGeom prst="rect">
+            <a:avLst/>
+          </a:prstGeom>
+        </p:spPr>
+        <p:txBody>
+          <a:bodyPr wrap="none">
+            <a:spAutoFit/>
+          </a:bodyPr>
+          <a:lstStyle/>
+          <a:p>
+            <a:r>
+              <a:rPr lang="en-US" altLang="zh-CN" dirty="0"/>
+              <a:t>t</a:t>
+            </a:r>
+          </a:p>
+        </p:txBody>
+      </p:sp>
+      <p:sp>
+        <p:nvSpPr>
+          <p:cNvPr id="35" name="矩形 43">
+            <a:extLst>
+              <a:ext uri="{FF2B5EF4-FFF2-40B4-BE49-F238E27FC236}">
+                <a16:creationId xmlns:a16="http://schemas.microsoft.com/office/drawing/2014/main" id="{ED7E9C68-2EAE-42F5-B825-6EFDB60844A8}"/>
+              </a:ext>
+            </a:extLst>
+          </p:cNvPr>
+          <p:cNvSpPr/>
+          <p:nvPr/>
+        </p:nvSpPr>
+        <p:spPr>
+          <a:xfrm>
+            <a:off x="9484850" y="3598277"/>
+            <a:ext cx="317716" cy="369332"/>
+          </a:xfrm>
+          <a:prstGeom prst="rect">
+            <a:avLst/>
+          </a:prstGeom>
+        </p:spPr>
+        <p:txBody>
+          <a:bodyPr wrap="none">
+            <a:spAutoFit/>
+          </a:bodyPr>
+          <a:lstStyle/>
+          <a:p>
+            <a:r>
+              <a:rPr lang="en-US" altLang="zh-CN" dirty="0"/>
+              <a:t>b</a:t>
+            </a:r>
+          </a:p>
+        </p:txBody>
+      </p:sp>
+      <p:sp>
+        <p:nvSpPr>
+          <p:cNvPr id="36" name="矩形 43">
+            <a:extLst>
+              <a:ext uri="{FF2B5EF4-FFF2-40B4-BE49-F238E27FC236}">
+                <a16:creationId xmlns:a16="http://schemas.microsoft.com/office/drawing/2014/main" id="{AC8E291F-EC73-4F69-8733-8ADED2F739EE}"/>
+              </a:ext>
+            </a:extLst>
+          </p:cNvPr>
+          <p:cNvSpPr/>
+          <p:nvPr/>
+        </p:nvSpPr>
+        <p:spPr>
+          <a:xfrm>
+            <a:off x="9300273" y="5869332"/>
+            <a:ext cx="317716" cy="369332"/>
+          </a:xfrm>
+          <a:prstGeom prst="rect">
+            <a:avLst/>
+          </a:prstGeom>
+        </p:spPr>
+        <p:txBody>
+          <a:bodyPr wrap="none">
+            <a:spAutoFit/>
+          </a:bodyPr>
+          <a:lstStyle/>
+          <a:p>
+            <a:r>
+              <a:rPr lang="en-US" altLang="zh-CN" dirty="0"/>
+              <a:t>b</a:t>
+            </a:r>
+          </a:p>
+        </p:txBody>
+      </p:sp>
+      <p:sp>
+        <p:nvSpPr>
+          <p:cNvPr id="37" name="矩形 43">
+            <a:extLst>
+              <a:ext uri="{FF2B5EF4-FFF2-40B4-BE49-F238E27FC236}">
+                <a16:creationId xmlns:a16="http://schemas.microsoft.com/office/drawing/2014/main" id="{1BC0F9EC-E537-4EEE-A683-073CCE2110E7}"/>
+              </a:ext>
+            </a:extLst>
+          </p:cNvPr>
+          <p:cNvSpPr/>
+          <p:nvPr/>
+        </p:nvSpPr>
+        <p:spPr>
+          <a:xfrm>
+            <a:off x="9304935" y="5153798"/>
+            <a:ext cx="258404" cy="369332"/>
+          </a:xfrm>
+          <a:prstGeom prst="rect">
+            <a:avLst/>
+          </a:prstGeom>
+        </p:spPr>
+        <p:txBody>
+          <a:bodyPr wrap="none">
+            <a:spAutoFit/>
+          </a:bodyPr>
+          <a:lstStyle/>
+          <a:p>
+            <a:r>
+              <a:rPr lang="en-US" altLang="zh-CN" dirty="0"/>
+              <a:t>t</a:t>
+            </a:r>
+          </a:p>
+        </p:txBody>
+      </p:sp>
+      <p:sp>
+        <p:nvSpPr>
+          <p:cNvPr id="38" name="矩形 43">
+            <a:extLst>
+              <a:ext uri="{FF2B5EF4-FFF2-40B4-BE49-F238E27FC236}">
+                <a16:creationId xmlns:a16="http://schemas.microsoft.com/office/drawing/2014/main" id="{E79D07E6-5CC8-44B6-8406-D91A132CDB67}"/>
+              </a:ext>
+            </a:extLst>
+          </p:cNvPr>
+          <p:cNvSpPr/>
+          <p:nvPr/>
+        </p:nvSpPr>
+        <p:spPr>
+          <a:xfrm>
+            <a:off x="9584270" y="5587703"/>
+            <a:ext cx="311304" cy="369332"/>
+          </a:xfrm>
+          <a:prstGeom prst="rect">
+            <a:avLst/>
+          </a:prstGeom>
+        </p:spPr>
+        <p:txBody>
+          <a:bodyPr wrap="none">
+            <a:spAutoFit/>
+          </a:bodyPr>
+          <a:lstStyle/>
+          <a:p>
+            <a:r>
+              <a:rPr lang="en-US" altLang="zh-CN" dirty="0"/>
+              <a:t>e</a:t>
+            </a:r>
+          </a:p>
+        </p:txBody>
+      </p:sp>
+      <p:sp>
+        <p:nvSpPr>
+          <p:cNvPr id="39" name="矩形 43">
+            <a:extLst>
+              <a:ext uri="{FF2B5EF4-FFF2-40B4-BE49-F238E27FC236}">
+                <a16:creationId xmlns:a16="http://schemas.microsoft.com/office/drawing/2014/main" id="{993F2B10-8074-433E-9EBA-FC23780A426D}"/>
+              </a:ext>
+            </a:extLst>
+          </p:cNvPr>
+          <p:cNvSpPr/>
+          <p:nvPr/>
+        </p:nvSpPr>
+        <p:spPr>
+          <a:xfrm>
+            <a:off x="9041764" y="5419906"/>
+            <a:ext cx="346570" cy="369332"/>
+          </a:xfrm>
+          <a:prstGeom prst="rect">
+            <a:avLst/>
+          </a:prstGeom>
+        </p:spPr>
+        <p:txBody>
+          <a:bodyPr wrap="none">
+            <a:spAutoFit/>
+          </a:bodyPr>
+          <a:lstStyle/>
+          <a:p>
+            <a:r>
+              <a:rPr lang="en-US" altLang="zh-CN" dirty="0"/>
+              <a:t>w</a:t>
+            </a:r>
+          </a:p>
+        </p:txBody>
+      </p:sp>
     </p:spTree>
     <p:extLst>
       <p:ext uri="{BB962C8B-B14F-4D97-AF65-F5344CB8AC3E}">
@@ -10341,7 +11202,7 @@
             <a:p>
               <a:r>
                 <a:rPr lang="en-US" altLang="zh-CN" dirty="0"/>
-                <a:t>4</a:t>
+                <a:t>5</a:t>
               </a:r>
               <a:endParaRPr lang="zh-CN" altLang="en-US" dirty="0"/>
             </a:p>
@@ -10376,7 +11237,7 @@
             <a:p>
               <a:r>
                 <a:rPr lang="en-US" altLang="zh-CN" dirty="0"/>
-                <a:t>5</a:t>
+                <a:t>4</a:t>
               </a:r>
               <a:endParaRPr lang="zh-CN" altLang="en-US" dirty="0"/>
             </a:p>

</xml_diff>